<commit_message>
Updates to presentation and pdf export of it.
</commit_message>
<xml_diff>
--- a/doc/final/FinalPresentation_Vimcryption.pptx
+++ b/doc/final/FinalPresentation_Vimcryption.pptx
@@ -5,7 +5,7 @@
     <p:sldMasterId id="2147485009" r:id="rId1"/>
   </p:sldMasterIdLst>
   <p:notesMasterIdLst>
-    <p:notesMasterId r:id="rId13"/>
+    <p:notesMasterId r:id="rId15"/>
   </p:notesMasterIdLst>
   <p:sldIdLst>
     <p:sldId id="256" r:id="rId2"/>
@@ -13,12 +13,14 @@
     <p:sldId id="258" r:id="rId4"/>
     <p:sldId id="259" r:id="rId5"/>
     <p:sldId id="261" r:id="rId6"/>
-    <p:sldId id="260" r:id="rId7"/>
-    <p:sldId id="262" r:id="rId8"/>
-    <p:sldId id="263" r:id="rId9"/>
-    <p:sldId id="264" r:id="rId10"/>
-    <p:sldId id="265" r:id="rId11"/>
-    <p:sldId id="266" r:id="rId12"/>
+    <p:sldId id="267" r:id="rId7"/>
+    <p:sldId id="260" r:id="rId8"/>
+    <p:sldId id="262" r:id="rId9"/>
+    <p:sldId id="263" r:id="rId10"/>
+    <p:sldId id="264" r:id="rId11"/>
+    <p:sldId id="265" r:id="rId12"/>
+    <p:sldId id="266" r:id="rId13"/>
+    <p:sldId id="268" r:id="rId14"/>
   </p:sldIdLst>
   <p:sldSz cx="12192000" cy="6858000"/>
   <p:notesSz cx="6858000" cy="9144000"/>
@@ -117,7 +119,20 @@
       </a:defRPr>
     </a:lvl9pPr>
   </p:defaultTextStyle>
+  <p:extLst>
+    <p:ext uri="{EFAFB233-063F-42B5-8137-9DF3F51BA10A}">
+      <p15:sldGuideLst xmlns:p15="http://schemas.microsoft.com/office/powerpoint/2012/main"/>
+    </p:ext>
+  </p:extLst>
 </p:presentation>
+</file>
+
+<file path=ppt/revisionInfo.xml><?xml version="1.0" encoding="utf-8"?>
+<p1510:revInfo xmlns:a="http://schemas.openxmlformats.org/drawingml/2006/main" xmlns:r="http://schemas.openxmlformats.org/officeDocument/2006/relationships" xmlns:p1510="http://schemas.microsoft.com/office/powerpoint/2015/10/main">
+  <p1510:revLst>
+    <p1510:client id="{41D6B599-397D-4F5F-BD57-D115E2131256}" v="983" dt="2018-04-22T23:54:37.321"/>
+  </p1510:revLst>
+</p1510:revInfo>
 </file>
 
 <file path=ppt/notesMasters/notesMaster1.xml><?xml version="1.0" encoding="utf-8"?>
@@ -202,7 +217,7 @@
           <a:p>
             <a:fld id="{4149D96D-9ED9-924E-982A-416C235E7FF7}" type="datetimeFigureOut">
               <a:rPr lang="en-US" smtClean="0"/>
-              <a:t>4/20/18</a:t>
+              <a:t>4/22/2018</a:t>
             </a:fld>
             <a:endParaRPr lang="en-US"/>
           </a:p>
@@ -266,38 +281,37 @@
           <a:p>
             <a:pPr lvl="0"/>
             <a:r>
-              <a:rPr lang="en-US" smtClean="0"/>
+              <a:rPr lang="en-US"/>
               <a:t>Click to edit Master text styles</a:t>
             </a:r>
           </a:p>
           <a:p>
             <a:pPr lvl="1"/>
             <a:r>
-              <a:rPr lang="en-US" smtClean="0"/>
+              <a:rPr lang="en-US"/>
               <a:t>Second level</a:t>
             </a:r>
           </a:p>
           <a:p>
             <a:pPr lvl="2"/>
             <a:r>
-              <a:rPr lang="en-US" smtClean="0"/>
+              <a:rPr lang="en-US"/>
               <a:t>Third level</a:t>
             </a:r>
           </a:p>
           <a:p>
             <a:pPr lvl="3"/>
             <a:r>
-              <a:rPr lang="en-US" smtClean="0"/>
+              <a:rPr lang="en-US"/>
               <a:t>Fourth level</a:t>
             </a:r>
           </a:p>
           <a:p>
             <a:pPr lvl="4"/>
             <a:r>
-              <a:rPr lang="en-US" smtClean="0"/>
+              <a:rPr lang="en-US"/>
               <a:t>Fifth level</a:t>
             </a:r>
-            <a:endParaRPr lang="en-US"/>
           </a:p>
         </p:txBody>
       </p:sp>
@@ -512,10 +526,9 @@
           </a:lstStyle>
           <a:p>
             <a:r>
-              <a:rPr lang="en-US" smtClean="0"/>
+              <a:rPr lang="en-US"/>
               <a:t>Click to edit Master title style</a:t>
             </a:r>
-            <a:endParaRPr lang="en-US"/>
           </a:p>
         </p:txBody>
       </p:sp>
@@ -577,10 +590,9 @@
           </a:lstStyle>
           <a:p>
             <a:r>
-              <a:rPr lang="en-US" smtClean="0"/>
+              <a:rPr lang="en-US"/>
               <a:t>Click to edit Master subtitle style</a:t>
             </a:r>
-            <a:endParaRPr lang="en-US"/>
           </a:p>
         </p:txBody>
       </p:sp>
@@ -601,7 +613,7 @@
           <a:p>
             <a:fld id="{C67438D2-B45A-C042-B15B-73BAC049D1A3}" type="datetimeFigureOut">
               <a:rPr lang="en-US" smtClean="0"/>
-              <a:t>4/20/18</a:t>
+              <a:t>4/22/2018</a:t>
             </a:fld>
             <a:endParaRPr lang="en-US"/>
           </a:p>
@@ -695,10 +707,9 @@
           <a:lstStyle/>
           <a:p>
             <a:r>
-              <a:rPr lang="en-US" smtClean="0"/>
+              <a:rPr lang="en-US"/>
               <a:t>Click to edit Master title style</a:t>
             </a:r>
-            <a:endParaRPr lang="en-US"/>
           </a:p>
         </p:txBody>
       </p:sp>
@@ -719,38 +730,37 @@
           <a:p>
             <a:pPr lvl="0"/>
             <a:r>
-              <a:rPr lang="en-US" smtClean="0"/>
+              <a:rPr lang="en-US"/>
               <a:t>Click to edit Master text styles</a:t>
             </a:r>
           </a:p>
           <a:p>
             <a:pPr lvl="1"/>
             <a:r>
-              <a:rPr lang="en-US" smtClean="0"/>
+              <a:rPr lang="en-US"/>
               <a:t>Second level</a:t>
             </a:r>
           </a:p>
           <a:p>
             <a:pPr lvl="2"/>
             <a:r>
-              <a:rPr lang="en-US" smtClean="0"/>
+              <a:rPr lang="en-US"/>
               <a:t>Third level</a:t>
             </a:r>
           </a:p>
           <a:p>
             <a:pPr lvl="3"/>
             <a:r>
-              <a:rPr lang="en-US" smtClean="0"/>
+              <a:rPr lang="en-US"/>
               <a:t>Fourth level</a:t>
             </a:r>
           </a:p>
           <a:p>
             <a:pPr lvl="4"/>
             <a:r>
-              <a:rPr lang="en-US" smtClean="0"/>
+              <a:rPr lang="en-US"/>
               <a:t>Fifth level</a:t>
             </a:r>
-            <a:endParaRPr lang="en-US"/>
           </a:p>
         </p:txBody>
       </p:sp>
@@ -771,7 +781,7 @@
           <a:p>
             <a:fld id="{C67438D2-B45A-C042-B15B-73BAC049D1A3}" type="datetimeFigureOut">
               <a:rPr lang="en-US" smtClean="0"/>
-              <a:t>4/20/18</a:t>
+              <a:t>4/22/2018</a:t>
             </a:fld>
             <a:endParaRPr lang="en-US"/>
           </a:p>
@@ -865,10 +875,9 @@
           <a:lstStyle/>
           <a:p>
             <a:r>
-              <a:rPr lang="en-US" smtClean="0"/>
+              <a:rPr lang="en-US"/>
               <a:t>Click to edit Master title style</a:t>
             </a:r>
-            <a:endParaRPr lang="en-US"/>
           </a:p>
         </p:txBody>
       </p:sp>
@@ -894,38 +903,37 @@
           <a:p>
             <a:pPr lvl="0"/>
             <a:r>
-              <a:rPr lang="en-US" smtClean="0"/>
+              <a:rPr lang="en-US"/>
               <a:t>Click to edit Master text styles</a:t>
             </a:r>
           </a:p>
           <a:p>
             <a:pPr lvl="1"/>
             <a:r>
-              <a:rPr lang="en-US" smtClean="0"/>
+              <a:rPr lang="en-US"/>
               <a:t>Second level</a:t>
             </a:r>
           </a:p>
           <a:p>
             <a:pPr lvl="2"/>
             <a:r>
-              <a:rPr lang="en-US" smtClean="0"/>
+              <a:rPr lang="en-US"/>
               <a:t>Third level</a:t>
             </a:r>
           </a:p>
           <a:p>
             <a:pPr lvl="3"/>
             <a:r>
-              <a:rPr lang="en-US" smtClean="0"/>
+              <a:rPr lang="en-US"/>
               <a:t>Fourth level</a:t>
             </a:r>
           </a:p>
           <a:p>
             <a:pPr lvl="4"/>
             <a:r>
-              <a:rPr lang="en-US" smtClean="0"/>
+              <a:rPr lang="en-US"/>
               <a:t>Fifth level</a:t>
             </a:r>
-            <a:endParaRPr lang="en-US"/>
           </a:p>
         </p:txBody>
       </p:sp>
@@ -946,7 +954,7 @@
           <a:p>
             <a:fld id="{C67438D2-B45A-C042-B15B-73BAC049D1A3}" type="datetimeFigureOut">
               <a:rPr lang="en-US" smtClean="0"/>
-              <a:t>4/20/18</a:t>
+              <a:t>4/22/2018</a:t>
             </a:fld>
             <a:endParaRPr lang="en-US"/>
           </a:p>
@@ -1040,10 +1048,9 @@
           <a:lstStyle/>
           <a:p>
             <a:r>
-              <a:rPr lang="en-US" smtClean="0"/>
+              <a:rPr lang="en-US"/>
               <a:t>Click to edit Master title style</a:t>
             </a:r>
-            <a:endParaRPr lang="en-US"/>
           </a:p>
         </p:txBody>
       </p:sp>
@@ -1064,38 +1071,37 @@
           <a:p>
             <a:pPr lvl="0"/>
             <a:r>
-              <a:rPr lang="en-US" smtClean="0"/>
+              <a:rPr lang="en-US"/>
               <a:t>Click to edit Master text styles</a:t>
             </a:r>
           </a:p>
           <a:p>
             <a:pPr lvl="1"/>
             <a:r>
-              <a:rPr lang="en-US" smtClean="0"/>
+              <a:rPr lang="en-US"/>
               <a:t>Second level</a:t>
             </a:r>
           </a:p>
           <a:p>
             <a:pPr lvl="2"/>
             <a:r>
-              <a:rPr lang="en-US" smtClean="0"/>
+              <a:rPr lang="en-US"/>
               <a:t>Third level</a:t>
             </a:r>
           </a:p>
           <a:p>
             <a:pPr lvl="3"/>
             <a:r>
-              <a:rPr lang="en-US" smtClean="0"/>
+              <a:rPr lang="en-US"/>
               <a:t>Fourth level</a:t>
             </a:r>
           </a:p>
           <a:p>
             <a:pPr lvl="4"/>
             <a:r>
-              <a:rPr lang="en-US" smtClean="0"/>
+              <a:rPr lang="en-US"/>
               <a:t>Fifth level</a:t>
             </a:r>
-            <a:endParaRPr lang="en-US"/>
           </a:p>
         </p:txBody>
       </p:sp>
@@ -1116,7 +1122,7 @@
           <a:p>
             <a:fld id="{C67438D2-B45A-C042-B15B-73BAC049D1A3}" type="datetimeFigureOut">
               <a:rPr lang="en-US" smtClean="0"/>
-              <a:t>4/20/18</a:t>
+              <a:t>4/22/2018</a:t>
             </a:fld>
             <a:endParaRPr lang="en-US"/>
           </a:p>
@@ -1214,10 +1220,9 @@
           </a:lstStyle>
           <a:p>
             <a:r>
-              <a:rPr lang="en-US" smtClean="0"/>
+              <a:rPr lang="en-US"/>
               <a:t>Click to edit Master title style</a:t>
             </a:r>
-            <a:endParaRPr lang="en-US"/>
           </a:p>
         </p:txBody>
       </p:sp>
@@ -1334,7 +1339,7 @@
           <a:p>
             <a:pPr lvl="0"/>
             <a:r>
-              <a:rPr lang="en-US" smtClean="0"/>
+              <a:rPr lang="en-US"/>
               <a:t>Click to edit Master text styles</a:t>
             </a:r>
           </a:p>
@@ -1357,7 +1362,7 @@
           <a:p>
             <a:fld id="{C67438D2-B45A-C042-B15B-73BAC049D1A3}" type="datetimeFigureOut">
               <a:rPr lang="en-US" smtClean="0"/>
-              <a:t>4/20/18</a:t>
+              <a:t>4/22/2018</a:t>
             </a:fld>
             <a:endParaRPr lang="en-US"/>
           </a:p>
@@ -1451,10 +1456,9 @@
           <a:lstStyle/>
           <a:p>
             <a:r>
-              <a:rPr lang="en-US" smtClean="0"/>
+              <a:rPr lang="en-US"/>
               <a:t>Click to edit Master title style</a:t>
             </a:r>
-            <a:endParaRPr lang="en-US"/>
           </a:p>
         </p:txBody>
       </p:sp>
@@ -1480,38 +1484,37 @@
           <a:p>
             <a:pPr lvl="0"/>
             <a:r>
-              <a:rPr lang="en-US" smtClean="0"/>
+              <a:rPr lang="en-US"/>
               <a:t>Click to edit Master text styles</a:t>
             </a:r>
           </a:p>
           <a:p>
             <a:pPr lvl="1"/>
             <a:r>
-              <a:rPr lang="en-US" smtClean="0"/>
+              <a:rPr lang="en-US"/>
               <a:t>Second level</a:t>
             </a:r>
           </a:p>
           <a:p>
             <a:pPr lvl="2"/>
             <a:r>
-              <a:rPr lang="en-US" smtClean="0"/>
+              <a:rPr lang="en-US"/>
               <a:t>Third level</a:t>
             </a:r>
           </a:p>
           <a:p>
             <a:pPr lvl="3"/>
             <a:r>
-              <a:rPr lang="en-US" smtClean="0"/>
+              <a:rPr lang="en-US"/>
               <a:t>Fourth level</a:t>
             </a:r>
           </a:p>
           <a:p>
             <a:pPr lvl="4"/>
             <a:r>
-              <a:rPr lang="en-US" smtClean="0"/>
+              <a:rPr lang="en-US"/>
               <a:t>Fifth level</a:t>
             </a:r>
-            <a:endParaRPr lang="en-US"/>
           </a:p>
         </p:txBody>
       </p:sp>
@@ -1537,38 +1540,37 @@
           <a:p>
             <a:pPr lvl="0"/>
             <a:r>
-              <a:rPr lang="en-US" smtClean="0"/>
+              <a:rPr lang="en-US"/>
               <a:t>Click to edit Master text styles</a:t>
             </a:r>
           </a:p>
           <a:p>
             <a:pPr lvl="1"/>
             <a:r>
-              <a:rPr lang="en-US" smtClean="0"/>
+              <a:rPr lang="en-US"/>
               <a:t>Second level</a:t>
             </a:r>
           </a:p>
           <a:p>
             <a:pPr lvl="2"/>
             <a:r>
-              <a:rPr lang="en-US" smtClean="0"/>
+              <a:rPr lang="en-US"/>
               <a:t>Third level</a:t>
             </a:r>
           </a:p>
           <a:p>
             <a:pPr lvl="3"/>
             <a:r>
-              <a:rPr lang="en-US" smtClean="0"/>
+              <a:rPr lang="en-US"/>
               <a:t>Fourth level</a:t>
             </a:r>
           </a:p>
           <a:p>
             <a:pPr lvl="4"/>
             <a:r>
-              <a:rPr lang="en-US" smtClean="0"/>
+              <a:rPr lang="en-US"/>
               <a:t>Fifth level</a:t>
             </a:r>
-            <a:endParaRPr lang="en-US"/>
           </a:p>
         </p:txBody>
       </p:sp>
@@ -1589,7 +1591,7 @@
           <a:p>
             <a:fld id="{C67438D2-B45A-C042-B15B-73BAC049D1A3}" type="datetimeFigureOut">
               <a:rPr lang="en-US" smtClean="0"/>
-              <a:t>4/20/18</a:t>
+              <a:t>4/22/2018</a:t>
             </a:fld>
             <a:endParaRPr lang="en-US"/>
           </a:p>
@@ -1688,10 +1690,9 @@
           <a:lstStyle/>
           <a:p>
             <a:r>
-              <a:rPr lang="en-US" smtClean="0"/>
+              <a:rPr lang="en-US"/>
               <a:t>Click to edit Master title style</a:t>
             </a:r>
-            <a:endParaRPr lang="en-US"/>
           </a:p>
         </p:txBody>
       </p:sp>
@@ -1754,7 +1755,7 @@
           <a:p>
             <a:pPr lvl="0"/>
             <a:r>
-              <a:rPr lang="en-US" smtClean="0"/>
+              <a:rPr lang="en-US"/>
               <a:t>Click to edit Master text styles</a:t>
             </a:r>
           </a:p>
@@ -1782,38 +1783,37 @@
           <a:p>
             <a:pPr lvl="0"/>
             <a:r>
-              <a:rPr lang="en-US" smtClean="0"/>
+              <a:rPr lang="en-US"/>
               <a:t>Click to edit Master text styles</a:t>
             </a:r>
           </a:p>
           <a:p>
             <a:pPr lvl="1"/>
             <a:r>
-              <a:rPr lang="en-US" smtClean="0"/>
+              <a:rPr lang="en-US"/>
               <a:t>Second level</a:t>
             </a:r>
           </a:p>
           <a:p>
             <a:pPr lvl="2"/>
             <a:r>
-              <a:rPr lang="en-US" smtClean="0"/>
+              <a:rPr lang="en-US"/>
               <a:t>Third level</a:t>
             </a:r>
           </a:p>
           <a:p>
             <a:pPr lvl="3"/>
             <a:r>
-              <a:rPr lang="en-US" smtClean="0"/>
+              <a:rPr lang="en-US"/>
               <a:t>Fourth level</a:t>
             </a:r>
           </a:p>
           <a:p>
             <a:pPr lvl="4"/>
             <a:r>
-              <a:rPr lang="en-US" smtClean="0"/>
+              <a:rPr lang="en-US"/>
               <a:t>Fifth level</a:t>
             </a:r>
-            <a:endParaRPr lang="en-US"/>
           </a:p>
         </p:txBody>
       </p:sp>
@@ -1876,7 +1876,7 @@
           <a:p>
             <a:pPr lvl="0"/>
             <a:r>
-              <a:rPr lang="en-US" smtClean="0"/>
+              <a:rPr lang="en-US"/>
               <a:t>Click to edit Master text styles</a:t>
             </a:r>
           </a:p>
@@ -1904,38 +1904,37 @@
           <a:p>
             <a:pPr lvl="0"/>
             <a:r>
-              <a:rPr lang="en-US" smtClean="0"/>
+              <a:rPr lang="en-US"/>
               <a:t>Click to edit Master text styles</a:t>
             </a:r>
           </a:p>
           <a:p>
             <a:pPr lvl="1"/>
             <a:r>
-              <a:rPr lang="en-US" smtClean="0"/>
+              <a:rPr lang="en-US"/>
               <a:t>Second level</a:t>
             </a:r>
           </a:p>
           <a:p>
             <a:pPr lvl="2"/>
             <a:r>
-              <a:rPr lang="en-US" smtClean="0"/>
+              <a:rPr lang="en-US"/>
               <a:t>Third level</a:t>
             </a:r>
           </a:p>
           <a:p>
             <a:pPr lvl="3"/>
             <a:r>
-              <a:rPr lang="en-US" smtClean="0"/>
+              <a:rPr lang="en-US"/>
               <a:t>Fourth level</a:t>
             </a:r>
           </a:p>
           <a:p>
             <a:pPr lvl="4"/>
             <a:r>
-              <a:rPr lang="en-US" smtClean="0"/>
+              <a:rPr lang="en-US"/>
               <a:t>Fifth level</a:t>
             </a:r>
-            <a:endParaRPr lang="en-US"/>
           </a:p>
         </p:txBody>
       </p:sp>
@@ -1956,7 +1955,7 @@
           <a:p>
             <a:fld id="{C67438D2-B45A-C042-B15B-73BAC049D1A3}" type="datetimeFigureOut">
               <a:rPr lang="en-US" smtClean="0"/>
-              <a:t>4/20/18</a:t>
+              <a:t>4/22/2018</a:t>
             </a:fld>
             <a:endParaRPr lang="en-US"/>
           </a:p>
@@ -2050,10 +2049,9 @@
           <a:lstStyle/>
           <a:p>
             <a:r>
-              <a:rPr lang="en-US" smtClean="0"/>
+              <a:rPr lang="en-US"/>
               <a:t>Click to edit Master title style</a:t>
             </a:r>
-            <a:endParaRPr lang="en-US"/>
           </a:p>
         </p:txBody>
       </p:sp>
@@ -2074,7 +2072,7 @@
           <a:p>
             <a:fld id="{C67438D2-B45A-C042-B15B-73BAC049D1A3}" type="datetimeFigureOut">
               <a:rPr lang="en-US" smtClean="0"/>
-              <a:t>4/20/18</a:t>
+              <a:t>4/22/2018</a:t>
             </a:fld>
             <a:endParaRPr lang="en-US"/>
           </a:p>
@@ -2164,7 +2162,7 @@
           <a:p>
             <a:fld id="{C67438D2-B45A-C042-B15B-73BAC049D1A3}" type="datetimeFigureOut">
               <a:rPr lang="en-US" smtClean="0"/>
-              <a:t>4/20/18</a:t>
+              <a:t>4/22/2018</a:t>
             </a:fld>
             <a:endParaRPr lang="en-US"/>
           </a:p>
@@ -2267,10 +2265,9 @@
           </a:lstStyle>
           <a:p>
             <a:r>
-              <a:rPr lang="en-US" smtClean="0"/>
+              <a:rPr lang="en-US"/>
               <a:t>Click to edit Master title style</a:t>
             </a:r>
-            <a:endParaRPr lang="en-US"/>
           </a:p>
         </p:txBody>
       </p:sp>
@@ -2324,38 +2321,37 @@
           <a:p>
             <a:pPr lvl="0"/>
             <a:r>
-              <a:rPr lang="en-US" smtClean="0"/>
+              <a:rPr lang="en-US"/>
               <a:t>Click to edit Master text styles</a:t>
             </a:r>
           </a:p>
           <a:p>
             <a:pPr lvl="1"/>
             <a:r>
-              <a:rPr lang="en-US" smtClean="0"/>
+              <a:rPr lang="en-US"/>
               <a:t>Second level</a:t>
             </a:r>
           </a:p>
           <a:p>
             <a:pPr lvl="2"/>
             <a:r>
-              <a:rPr lang="en-US" smtClean="0"/>
+              <a:rPr lang="en-US"/>
               <a:t>Third level</a:t>
             </a:r>
           </a:p>
           <a:p>
             <a:pPr lvl="3"/>
             <a:r>
-              <a:rPr lang="en-US" smtClean="0"/>
+              <a:rPr lang="en-US"/>
               <a:t>Fourth level</a:t>
             </a:r>
           </a:p>
           <a:p>
             <a:pPr lvl="4"/>
             <a:r>
-              <a:rPr lang="en-US" smtClean="0"/>
+              <a:rPr lang="en-US"/>
               <a:t>Fifth level</a:t>
             </a:r>
-            <a:endParaRPr lang="en-US"/>
           </a:p>
         </p:txBody>
       </p:sp>
@@ -2418,7 +2414,7 @@
           <a:p>
             <a:pPr lvl="0"/>
             <a:r>
-              <a:rPr lang="en-US" smtClean="0"/>
+              <a:rPr lang="en-US"/>
               <a:t>Click to edit Master text styles</a:t>
             </a:r>
           </a:p>
@@ -2441,7 +2437,7 @@
           <a:p>
             <a:fld id="{C67438D2-B45A-C042-B15B-73BAC049D1A3}" type="datetimeFigureOut">
               <a:rPr lang="en-US" smtClean="0"/>
-              <a:t>4/20/18</a:t>
+              <a:t>4/22/2018</a:t>
             </a:fld>
             <a:endParaRPr lang="en-US"/>
           </a:p>
@@ -2544,10 +2540,9 @@
           </a:lstStyle>
           <a:p>
             <a:r>
-              <a:rPr lang="en-US" smtClean="0"/>
+              <a:rPr lang="en-US"/>
               <a:t>Click to edit Master title style</a:t>
             </a:r>
-            <a:endParaRPr lang="en-US"/>
           </a:p>
         </p:txBody>
       </p:sp>
@@ -2671,7 +2666,7 @@
           <a:p>
             <a:pPr lvl="0"/>
             <a:r>
-              <a:rPr lang="en-US" smtClean="0"/>
+              <a:rPr lang="en-US"/>
               <a:t>Click to edit Master text styles</a:t>
             </a:r>
           </a:p>
@@ -2694,7 +2689,7 @@
           <a:p>
             <a:fld id="{C67438D2-B45A-C042-B15B-73BAC049D1A3}" type="datetimeFigureOut">
               <a:rPr lang="en-US" smtClean="0"/>
-              <a:t>4/20/18</a:t>
+              <a:t>4/22/2018</a:t>
             </a:fld>
             <a:endParaRPr lang="en-US"/>
           </a:p>
@@ -2716,7 +2711,7 @@
           <a:lstStyle/>
           <a:p>
             <a:r>
-              <a:rPr lang="en-US" smtClean="0"/>
+              <a:rPr lang="en-US"/>
               <a:t>
               </a:t>
             </a:r>
@@ -2828,10 +2823,9 @@
           <a:lstStyle/>
           <a:p>
             <a:r>
-              <a:rPr lang="en-US" smtClean="0"/>
+              <a:rPr lang="en-US"/>
               <a:t>Click to edit Master title style</a:t>
             </a:r>
-            <a:endParaRPr lang="en-US"/>
           </a:p>
         </p:txBody>
       </p:sp>
@@ -2862,38 +2856,37 @@
           <a:p>
             <a:pPr lvl="0"/>
             <a:r>
-              <a:rPr lang="en-US" smtClean="0"/>
+              <a:rPr lang="en-US"/>
               <a:t>Click to edit Master text styles</a:t>
             </a:r>
           </a:p>
           <a:p>
             <a:pPr lvl="1"/>
             <a:r>
-              <a:rPr lang="en-US" smtClean="0"/>
+              <a:rPr lang="en-US"/>
               <a:t>Second level</a:t>
             </a:r>
           </a:p>
           <a:p>
             <a:pPr lvl="2"/>
             <a:r>
-              <a:rPr lang="en-US" smtClean="0"/>
+              <a:rPr lang="en-US"/>
               <a:t>Third level</a:t>
             </a:r>
           </a:p>
           <a:p>
             <a:pPr lvl="3"/>
             <a:r>
-              <a:rPr lang="en-US" smtClean="0"/>
+              <a:rPr lang="en-US"/>
               <a:t>Fourth level</a:t>
             </a:r>
           </a:p>
           <a:p>
             <a:pPr lvl="4"/>
             <a:r>
-              <a:rPr lang="en-US" smtClean="0"/>
+              <a:rPr lang="en-US"/>
               <a:t>Fifth level</a:t>
             </a:r>
-            <a:endParaRPr lang="en-US"/>
           </a:p>
         </p:txBody>
       </p:sp>
@@ -2932,7 +2925,7 @@
           <a:p>
             <a:fld id="{C67438D2-B45A-C042-B15B-73BAC049D1A3}" type="datetimeFigureOut">
               <a:rPr lang="en-US" smtClean="0"/>
-              <a:t>4/20/18</a:t>
+              <a:t>4/22/2018</a:t>
             </a:fld>
             <a:endParaRPr lang="en-US"/>
           </a:p>
@@ -3358,7 +3351,7 @@
           <a:lstStyle/>
           <a:p>
             <a:r>
-              <a:rPr lang="en-US" dirty="0" err="1" smtClean="0"/>
+              <a:rPr lang="en-US" dirty="0" err="1"/>
               <a:t>Vimcryption</a:t>
             </a:r>
             <a:endParaRPr lang="en-US" dirty="0"/>
@@ -3381,11 +3374,11 @@
           <a:lstStyle/>
           <a:p>
             <a:r>
-              <a:rPr lang="en-US" dirty="0" smtClean="0"/>
+              <a:rPr lang="en-US" dirty="0"/>
               <a:t>Thomas Manner and Miguel </a:t>
             </a:r>
             <a:r>
-              <a:rPr lang="en-US" dirty="0" err="1" smtClean="0"/>
+              <a:rPr lang="en-US" dirty="0" err="1"/>
               <a:t>Nistal</a:t>
             </a:r>
             <a:endParaRPr lang="en-US" dirty="0"/>
@@ -3432,42 +3425,27 @@
             <p:ph type="title"/>
           </p:nvPr>
         </p:nvSpPr>
-        <p:spPr/>
-        <p:txBody>
-          <a:bodyPr/>
-          <a:lstStyle/>
-          <a:p>
-            <a:r>
-              <a:rPr lang="en-US" dirty="0" smtClean="0"/>
-              <a:t>Final Thoughts</a:t>
-            </a:r>
-            <a:endParaRPr lang="en-US" dirty="0"/>
-          </a:p>
-        </p:txBody>
-      </p:sp>
-      <p:sp>
-        <p:nvSpPr>
-          <p:cNvPr id="3" name="Content Placeholder 2"/>
-          <p:cNvSpPr>
-            <a:spLocks noGrp="1"/>
-          </p:cNvSpPr>
-          <p:nvPr>
-            <p:ph idx="1"/>
-          </p:nvPr>
-        </p:nvSpPr>
-        <p:spPr/>
-        <p:txBody>
-          <a:bodyPr/>
-          <a:lstStyle/>
-          <a:p>
-            <a:endParaRPr lang="en-US"/>
+        <p:spPr>
+          <a:xfrm>
+            <a:off x="3545005" y="2366796"/>
+            <a:ext cx="5500049" cy="1325563"/>
+          </a:xfrm>
+        </p:spPr>
+        <p:txBody>
+          <a:bodyPr/>
+          <a:lstStyle/>
+          <a:p>
+            <a:r>
+              <a:rPr lang="en-US" dirty="0"/>
+              <a:t>Demo: Let's Vimcrypt!</a:t>
+            </a:r>
           </a:p>
         </p:txBody>
       </p:sp>
     </p:spTree>
     <p:extLst>
       <p:ext uri="{BB962C8B-B14F-4D97-AF65-F5344CB8AC3E}">
-        <p14:creationId xmlns:p14="http://schemas.microsoft.com/office/powerpoint/2010/main" val="2108387190"/>
+        <p14:creationId xmlns:p14="http://schemas.microsoft.com/office/powerpoint/2010/main" val="393091065"/>
       </p:ext>
     </p:extLst>
   </p:cSld>
@@ -3501,6 +3479,142 @@
             <a:spLocks noGrp="1"/>
           </p:cNvSpPr>
           <p:nvPr>
+            <p:ph type="title"/>
+          </p:nvPr>
+        </p:nvSpPr>
+        <p:spPr/>
+        <p:txBody>
+          <a:bodyPr/>
+          <a:lstStyle/>
+          <a:p>
+            <a:r>
+              <a:rPr lang="en-US" dirty="0"/>
+              <a:t>Final Thoughts</a:t>
+            </a:r>
+          </a:p>
+        </p:txBody>
+      </p:sp>
+      <p:sp>
+        <p:nvSpPr>
+          <p:cNvPr id="3" name="Content Placeholder 2"/>
+          <p:cNvSpPr>
+            <a:spLocks noGrp="1"/>
+          </p:cNvSpPr>
+          <p:nvPr>
+            <p:ph idx="1"/>
+          </p:nvPr>
+        </p:nvSpPr>
+        <p:spPr>
+          <a:xfrm>
+            <a:off x="838200" y="1502744"/>
+            <a:ext cx="10515600" cy="4674219"/>
+          </a:xfrm>
+        </p:spPr>
+        <p:txBody>
+          <a:bodyPr vert="horz" lIns="91440" tIns="45720" rIns="91440" bIns="45720" rtlCol="0" anchor="t">
+            <a:normAutofit/>
+          </a:bodyPr>
+          <a:lstStyle/>
+          <a:p>
+            <a:r>
+              <a:rPr lang="en-US" dirty="0">
+                <a:cs typeface="Calibri"/>
+              </a:rPr>
+              <a:t>Project will be available via GitHub and installable via Pathogen and </a:t>
+            </a:r>
+            <a:r>
+              <a:rPr lang="en-US" dirty="0" err="1">
+                <a:cs typeface="Calibri"/>
+              </a:rPr>
+              <a:t>Vundle</a:t>
+            </a:r>
+            <a:r>
+              <a:rPr lang="en-US" dirty="0">
+                <a:cs typeface="Calibri"/>
+              </a:rPr>
+              <a:t>! Look for the project on vimawesome.com!</a:t>
+            </a:r>
+          </a:p>
+          <a:p>
+            <a:r>
+              <a:rPr lang="en-US" dirty="0">
+                <a:cs typeface="Calibri"/>
+              </a:rPr>
+              <a:t>Learned a lot about the practical implications of security when dealing with File System Operations and text editing</a:t>
+            </a:r>
+          </a:p>
+          <a:p>
+            <a:r>
+              <a:rPr lang="en-US" dirty="0">
+                <a:cs typeface="Calibri"/>
+              </a:rPr>
+              <a:t>We want to continue development, eventually supporting asymmetric key encryption so you can easily share files with your friends </a:t>
+            </a:r>
+          </a:p>
+          <a:p>
+            <a:r>
+              <a:rPr lang="en-US" dirty="0">
+                <a:cs typeface="Calibri"/>
+              </a:rPr>
+              <a:t>We've also found that Python lacks a generally accepted encryption library to match the built-in cryptographic </a:t>
+            </a:r>
+            <a:r>
+              <a:rPr lang="en-US" dirty="0" err="1">
+                <a:cs typeface="Calibri"/>
+              </a:rPr>
+              <a:t>hashlib</a:t>
+            </a:r>
+            <a:r>
+              <a:rPr lang="en-US" dirty="0">
+                <a:cs typeface="Calibri"/>
+              </a:rPr>
+              <a:t> – This is a need we can solve, maybe we'll get a PEP! </a:t>
+            </a:r>
+          </a:p>
+          <a:p>
+            <a:endParaRPr lang="en-US" dirty="0">
+              <a:cs typeface="Calibri"/>
+            </a:endParaRPr>
+          </a:p>
+        </p:txBody>
+      </p:sp>
+    </p:spTree>
+    <p:extLst>
+      <p:ext uri="{BB962C8B-B14F-4D97-AF65-F5344CB8AC3E}">
+        <p14:creationId xmlns:p14="http://schemas.microsoft.com/office/powerpoint/2010/main" val="2108387190"/>
+      </p:ext>
+    </p:extLst>
+  </p:cSld>
+  <p:clrMapOvr>
+    <a:masterClrMapping/>
+  </p:clrMapOvr>
+</p:sld>
+</file>
+
+<file path=ppt/slides/slide12.xml><?xml version="1.0" encoding="utf-8"?>
+<p:sld xmlns:a="http://schemas.openxmlformats.org/drawingml/2006/main" xmlns:r="http://schemas.openxmlformats.org/officeDocument/2006/relationships" xmlns:p="http://schemas.openxmlformats.org/presentationml/2006/main">
+  <p:cSld>
+    <p:spTree>
+      <p:nvGrpSpPr>
+        <p:cNvPr id="1" name=""/>
+        <p:cNvGrpSpPr/>
+        <p:nvPr/>
+      </p:nvGrpSpPr>
+      <p:grpSpPr>
+        <a:xfrm>
+          <a:off x="0" y="0"/>
+          <a:ext cx="0" cy="0"/>
+          <a:chOff x="0" y="0"/>
+          <a:chExt cx="0" cy="0"/>
+        </a:xfrm>
+      </p:grpSpPr>
+      <p:sp>
+        <p:nvSpPr>
+          <p:cNvPr id="2" name="Title 1"/>
+          <p:cNvSpPr>
+            <a:spLocks noGrp="1"/>
+          </p:cNvSpPr>
+          <p:nvPr>
             <p:ph type="ctrTitle"/>
           </p:nvPr>
         </p:nvSpPr>
@@ -3510,10 +3624,9 @@
           <a:lstStyle/>
           <a:p>
             <a:r>
-              <a:rPr lang="en-US" dirty="0" smtClean="0"/>
+              <a:rPr lang="en-US" dirty="0"/>
               <a:t>Thank you!</a:t>
             </a:r>
-            <a:endParaRPr lang="en-US" dirty="0"/>
           </a:p>
         </p:txBody>
       </p:sp>
@@ -3540,6 +3653,272 @@
     <p:extLst>
       <p:ext uri="{BB962C8B-B14F-4D97-AF65-F5344CB8AC3E}">
         <p14:creationId xmlns:p14="http://schemas.microsoft.com/office/powerpoint/2010/main" val="416220731"/>
+      </p:ext>
+    </p:extLst>
+  </p:cSld>
+  <p:clrMapOvr>
+    <a:masterClrMapping/>
+  </p:clrMapOvr>
+</p:sld>
+</file>
+
+<file path=ppt/slides/slide13.xml><?xml version="1.0" encoding="utf-8"?>
+<p:sld xmlns:a="http://schemas.openxmlformats.org/drawingml/2006/main" xmlns:r="http://schemas.openxmlformats.org/officeDocument/2006/relationships" xmlns:p="http://schemas.openxmlformats.org/presentationml/2006/main">
+  <p:cSld>
+    <p:spTree>
+      <p:nvGrpSpPr>
+        <p:cNvPr id="1" name=""/>
+        <p:cNvGrpSpPr/>
+        <p:nvPr/>
+      </p:nvGrpSpPr>
+      <p:grpSpPr>
+        <a:xfrm>
+          <a:off x="0" y="0"/>
+          <a:ext cx="0" cy="0"/>
+          <a:chOff x="0" y="0"/>
+          <a:chExt cx="0" cy="0"/>
+        </a:xfrm>
+      </p:grpSpPr>
+      <p:sp>
+        <p:nvSpPr>
+          <p:cNvPr id="2" name="Title 1">
+            <a:extLst>
+              <a:ext uri="{FF2B5EF4-FFF2-40B4-BE49-F238E27FC236}">
+                <a16:creationId xmlns:a16="http://schemas.microsoft.com/office/drawing/2014/main" id="{6242C91B-FBD6-4894-9004-4C4011B6F17C}"/>
+              </a:ext>
+            </a:extLst>
+          </p:cNvPr>
+          <p:cNvSpPr>
+            <a:spLocks noGrp="1"/>
+          </p:cNvSpPr>
+          <p:nvPr>
+            <p:ph type="title"/>
+          </p:nvPr>
+        </p:nvSpPr>
+        <p:spPr/>
+        <p:txBody>
+          <a:bodyPr/>
+          <a:lstStyle/>
+          <a:p>
+            <a:r>
+              <a:rPr lang="en-US" dirty="0">
+                <a:cs typeface="Calibri Light"/>
+              </a:rPr>
+              <a:t>Resources</a:t>
+            </a:r>
+            <a:endParaRPr lang="en-US" dirty="0"/>
+          </a:p>
+        </p:txBody>
+      </p:sp>
+      <p:sp>
+        <p:nvSpPr>
+          <p:cNvPr id="3" name="Content Placeholder 2">
+            <a:extLst>
+              <a:ext uri="{FF2B5EF4-FFF2-40B4-BE49-F238E27FC236}">
+                <a16:creationId xmlns:a16="http://schemas.microsoft.com/office/drawing/2014/main" id="{08DDA793-83A7-483E-BBB9-833D9EDD7621}"/>
+              </a:ext>
+            </a:extLst>
+          </p:cNvPr>
+          <p:cNvSpPr>
+            <a:spLocks noGrp="1"/>
+          </p:cNvSpPr>
+          <p:nvPr>
+            <p:ph idx="1"/>
+          </p:nvPr>
+        </p:nvSpPr>
+        <p:spPr/>
+        <p:txBody>
+          <a:bodyPr vert="horz" lIns="91440" tIns="45720" rIns="91440" bIns="45720" rtlCol="0" anchor="t">
+            <a:normAutofit fontScale="92500" lnSpcReduction="20000"/>
+          </a:bodyPr>
+          <a:lstStyle/>
+          <a:p>
+            <a:r>
+              <a:rPr lang="en-US" dirty="0" err="1">
+                <a:cs typeface="Calibri"/>
+              </a:rPr>
+              <a:t>VimScript</a:t>
+            </a:r>
+            <a:r>
+              <a:rPr lang="en-US">
+                <a:cs typeface="Calibri"/>
+              </a:rPr>
+              <a:t> API:</a:t>
+            </a:r>
+          </a:p>
+          <a:p>
+            <a:pPr lvl="1"/>
+            <a:r>
+              <a:rPr lang="en-US" dirty="0">
+                <a:cs typeface="Calibri"/>
+              </a:rPr>
+              <a:t> </a:t>
+            </a:r>
+            <a:r>
+              <a:rPr lang="en-US" dirty="0">
+                <a:cs typeface="Calibri"/>
+                <a:hlinkClick r:id="rId2"/>
+              </a:rPr>
+              <a:t>https://devhints.io/vimscript</a:t>
+            </a:r>
+            <a:endParaRPr lang="en-US" dirty="0">
+              <a:cs typeface="Calibri"/>
+            </a:endParaRPr>
+          </a:p>
+          <a:p>
+            <a:r>
+              <a:rPr lang="en-US" dirty="0" err="1">
+                <a:cs typeface="Calibri"/>
+              </a:rPr>
+              <a:t>VimScript</a:t>
+            </a:r>
+            <a:r>
+              <a:rPr lang="en-US">
+                <a:cs typeface="Calibri"/>
+              </a:rPr>
+              <a:t> </a:t>
+            </a:r>
+            <a:r>
+              <a:rPr lang="en-US" dirty="0" err="1">
+                <a:cs typeface="Calibri"/>
+              </a:rPr>
+              <a:t>CmdEvent</a:t>
+            </a:r>
+            <a:r>
+              <a:rPr lang="en-US">
+                <a:cs typeface="Calibri"/>
+              </a:rPr>
+              <a:t> Reference:</a:t>
+            </a:r>
+          </a:p>
+          <a:p>
+            <a:pPr lvl="1"/>
+            <a:r>
+              <a:rPr lang="en-US">
+                <a:cs typeface="Calibri"/>
+              </a:rPr>
+              <a:t> </a:t>
+            </a:r>
+            <a:r>
+              <a:rPr lang="en-US" dirty="0">
+                <a:cs typeface="Calibri"/>
+                <a:hlinkClick r:id="rId3"/>
+              </a:rPr>
+              <a:t>http://vimdoc.sourceforge.net/htmldoc/autocmd.html</a:t>
+            </a:r>
+            <a:endParaRPr lang="en-US">
+              <a:cs typeface="Calibri"/>
+            </a:endParaRPr>
+          </a:p>
+          <a:p>
+            <a:r>
+              <a:rPr lang="en-US" dirty="0" err="1">
+                <a:cs typeface="Calibri"/>
+              </a:rPr>
+              <a:t>VimScript</a:t>
+            </a:r>
+            <a:r>
+              <a:rPr lang="en-US">
+                <a:cs typeface="Calibri"/>
+              </a:rPr>
+              <a:t> Python Reference: </a:t>
+            </a:r>
+          </a:p>
+          <a:p>
+            <a:pPr lvl="1"/>
+            <a:r>
+              <a:rPr lang="en-US" dirty="0">
+                <a:cs typeface="Calibri"/>
+                <a:hlinkClick r:id="rId4"/>
+              </a:rPr>
+              <a:t>http://vimdoc.sourceforge.net/htmldoc/if_pyth.html</a:t>
+            </a:r>
+            <a:endParaRPr lang="en-US">
+              <a:cs typeface="Calibri"/>
+            </a:endParaRPr>
+          </a:p>
+          <a:p>
+            <a:r>
+              <a:rPr lang="en-US" dirty="0" err="1">
+                <a:cs typeface="Calibri"/>
+              </a:rPr>
+              <a:t>VimScript</a:t>
+            </a:r>
+            <a:r>
+              <a:rPr lang="en-US" dirty="0">
+                <a:cs typeface="Calibri"/>
+              </a:rPr>
+              <a:t> Tutorial:</a:t>
+            </a:r>
+          </a:p>
+          <a:p>
+            <a:pPr lvl="1"/>
+            <a:r>
+              <a:rPr lang="en-US" dirty="0">
+                <a:cs typeface="Calibri"/>
+                <a:hlinkClick r:id="rId5"/>
+              </a:rPr>
+              <a:t>http://learnvimscriptthehardway.stevelosh.com/</a:t>
+            </a:r>
+          </a:p>
+          <a:p>
+            <a:r>
+              <a:rPr lang="en-US" dirty="0">
+                <a:cs typeface="Calibri"/>
+              </a:rPr>
+              <a:t>Python Generators:</a:t>
+            </a:r>
+          </a:p>
+          <a:p>
+            <a:pPr lvl="1"/>
+            <a:r>
+              <a:rPr lang="en-US" dirty="0">
+                <a:cs typeface="Calibri"/>
+                <a:hlinkClick r:id="rId6"/>
+              </a:rPr>
+              <a:t>https://wiki.python.org/moin/Generators</a:t>
+            </a:r>
+          </a:p>
+          <a:p>
+            <a:r>
+              <a:rPr lang="en-US" dirty="0">
+                <a:cs typeface="Calibri"/>
+              </a:rPr>
+              <a:t>Python Unit Testing:</a:t>
+            </a:r>
+          </a:p>
+          <a:p>
+            <a:pPr lvl="1"/>
+            <a:r>
+              <a:rPr lang="en-US" dirty="0">
+                <a:cs typeface="Calibri"/>
+                <a:hlinkClick r:id="rId7"/>
+              </a:rPr>
+              <a:t>https://docs.python.org/3/library/unittest.html</a:t>
+            </a:r>
+          </a:p>
+          <a:p>
+            <a:pPr lvl="1"/>
+            <a:endParaRPr lang="en-US" dirty="0">
+              <a:cs typeface="Calibri"/>
+            </a:endParaRPr>
+          </a:p>
+          <a:p>
+            <a:endParaRPr lang="en-US" dirty="0">
+              <a:cs typeface="Calibri"/>
+            </a:endParaRPr>
+          </a:p>
+          <a:p>
+            <a:endParaRPr lang="en-US" dirty="0">
+              <a:cs typeface="Calibri"/>
+            </a:endParaRPr>
+          </a:p>
+        </p:txBody>
+      </p:sp>
+    </p:spTree>
+    <p:extLst>
+      <p:ext uri="{BB962C8B-B14F-4D97-AF65-F5344CB8AC3E}">
+        <p14:creationId xmlns:p14="http://schemas.microsoft.com/office/powerpoint/2010/main" val="486436885"/>
       </p:ext>
     </p:extLst>
   </p:cSld>
@@ -3582,10 +3961,9 @@
           <a:lstStyle/>
           <a:p>
             <a:r>
-              <a:rPr lang="en-US" dirty="0" smtClean="0"/>
+              <a:rPr lang="en-US" dirty="0"/>
               <a:t>Motivation: Vim Needs Encryption Options!</a:t>
             </a:r>
-            <a:endParaRPr lang="en-US" dirty="0"/>
           </a:p>
         </p:txBody>
       </p:sp>
@@ -3599,12 +3977,101 @@
             <p:ph idx="1"/>
           </p:nvPr>
         </p:nvSpPr>
-        <p:spPr/>
-        <p:txBody>
-          <a:bodyPr/>
-          <a:lstStyle/>
-          <a:p>
-            <a:endParaRPr lang="en-US"/>
+        <p:spPr>
+          <a:xfrm>
+            <a:off x="838200" y="1528574"/>
+            <a:ext cx="10515600" cy="4351338"/>
+          </a:xfrm>
+        </p:spPr>
+        <p:txBody>
+          <a:bodyPr vert="horz" lIns="91440" tIns="45720" rIns="91440" bIns="45720" rtlCol="0" anchor="t">
+            <a:normAutofit/>
+          </a:bodyPr>
+          <a:lstStyle/>
+          <a:p>
+            <a:r>
+              <a:rPr lang="en-US" dirty="0">
+                <a:cs typeface="Calibri"/>
+              </a:rPr>
+              <a:t>Vim is one of the most popular editors of all time (</a:t>
+            </a:r>
+            <a:r>
+              <a:rPr lang="en-US" dirty="0">
+                <a:cs typeface="Calibri"/>
+                <a:hlinkClick r:id="rId2"/>
+              </a:rPr>
+              <a:t>https://stackoverflow.blog/2017/05/23/stack-overflow-helping-one-million-developers-exit-vim/</a:t>
+            </a:r>
+            <a:r>
+              <a:rPr lang="en-US" dirty="0">
+                <a:cs typeface="Calibri"/>
+              </a:rPr>
+              <a:t>)</a:t>
+            </a:r>
+          </a:p>
+          <a:p>
+            <a:r>
+              <a:rPr lang="en-US" dirty="0">
+                <a:cs typeface="Calibri"/>
+              </a:rPr>
+              <a:t>Very extensible (and with Python!)</a:t>
+            </a:r>
+          </a:p>
+          <a:p>
+            <a:r>
+              <a:rPr lang="en-US" dirty="0">
+                <a:cs typeface="Calibri"/>
+              </a:rPr>
+              <a:t>Vim currently doesn't have any good encryption options (</a:t>
+            </a:r>
+            <a:r>
+              <a:rPr lang="en-US" dirty="0" err="1">
+                <a:cs typeface="Calibri"/>
+              </a:rPr>
+              <a:t>pkzip</a:t>
+            </a:r>
+            <a:r>
+              <a:rPr lang="en-US" dirty="0">
+                <a:cs typeface="Calibri"/>
+              </a:rPr>
+              <a:t>, blowfish, blowfish2, or </a:t>
+            </a:r>
+            <a:r>
+              <a:rPr lang="en-US" dirty="0" err="1">
+                <a:cs typeface="Calibri"/>
+              </a:rPr>
+              <a:t>gnupg</a:t>
+            </a:r>
+            <a:r>
+              <a:rPr lang="en-US" dirty="0">
+                <a:cs typeface="Calibri"/>
+              </a:rPr>
+              <a:t> plugin)</a:t>
+            </a:r>
+          </a:p>
+          <a:p>
+            <a:r>
+              <a:rPr lang="en-US" dirty="0" err="1">
+                <a:cs typeface="Calibri"/>
+              </a:rPr>
+              <a:t>Vimcryption</a:t>
+            </a:r>
+            <a:r>
+              <a:rPr lang="en-US" dirty="0">
+                <a:cs typeface="Calibri"/>
+              </a:rPr>
+              <a:t> makes a good foundation for a long term open-source project</a:t>
+            </a:r>
+          </a:p>
+          <a:p>
+            <a:endParaRPr lang="en-US" dirty="0">
+              <a:cs typeface="Calibri"/>
+            </a:endParaRPr>
+          </a:p>
+          <a:p>
+            <a:endParaRPr lang="en-US" dirty="0">
+              <a:cs typeface="Calibri"/>
+            </a:endParaRPr>
           </a:p>
         </p:txBody>
       </p:sp>
@@ -3648,38 +4115,144 @@
             <p:ph type="title"/>
           </p:nvPr>
         </p:nvSpPr>
-        <p:spPr/>
-        <p:txBody>
-          <a:bodyPr/>
-          <a:lstStyle/>
-          <a:p>
-            <a:r>
-              <a:rPr lang="en-US" dirty="0" smtClean="0"/>
+        <p:spPr>
+          <a:xfrm>
+            <a:off x="838200" y="145566"/>
+            <a:ext cx="10515600" cy="1325563"/>
+          </a:xfrm>
+        </p:spPr>
+        <p:txBody>
+          <a:bodyPr/>
+          <a:lstStyle/>
+          <a:p>
+            <a:r>
+              <a:rPr lang="en-US" dirty="0"/>
               <a:t>Building a Vim Plugin</a:t>
             </a:r>
+          </a:p>
+        </p:txBody>
+      </p:sp>
+      <p:sp>
+        <p:nvSpPr>
+          <p:cNvPr id="3" name="Content Placeholder 2"/>
+          <p:cNvSpPr>
+            <a:spLocks noGrp="1"/>
+          </p:cNvSpPr>
+          <p:nvPr>
+            <p:ph idx="1"/>
+          </p:nvPr>
+        </p:nvSpPr>
+        <p:spPr>
+          <a:xfrm>
+            <a:off x="838200" y="1347760"/>
+            <a:ext cx="10838482" cy="4738796"/>
+          </a:xfrm>
+        </p:spPr>
+        <p:txBody>
+          <a:bodyPr vert="horz" lIns="91440" tIns="45720" rIns="91440" bIns="45720" rtlCol="0" anchor="t">
+            <a:normAutofit/>
+          </a:bodyPr>
+          <a:lstStyle/>
+          <a:p>
+            <a:r>
+              <a:rPr lang="en-US" dirty="0">
+                <a:cs typeface="Calibri"/>
+              </a:rPr>
+              <a:t>Vim Plugins are written in </a:t>
+            </a:r>
+            <a:r>
+              <a:rPr lang="en-US" dirty="0" err="1">
+                <a:cs typeface="Calibri"/>
+              </a:rPr>
+              <a:t>VimScript</a:t>
+            </a:r>
+            <a:r>
+              <a:rPr lang="en-US" dirty="0">
+                <a:cs typeface="Calibri"/>
+              </a:rPr>
+              <a:t> with a common structure</a:t>
+            </a:r>
             <a:endParaRPr lang="en-US" dirty="0"/>
           </a:p>
-        </p:txBody>
-      </p:sp>
-      <p:sp>
-        <p:nvSpPr>
-          <p:cNvPr id="3" name="Content Placeholder 2"/>
-          <p:cNvSpPr>
-            <a:spLocks noGrp="1"/>
-          </p:cNvSpPr>
-          <p:nvPr>
-            <p:ph idx="1"/>
-          </p:nvPr>
-        </p:nvSpPr>
-        <p:spPr/>
-        <p:txBody>
-          <a:bodyPr/>
-          <a:lstStyle/>
-          <a:p>
-            <a:endParaRPr lang="en-US"/>
-          </a:p>
-        </p:txBody>
-      </p:sp>
+          <a:p>
+            <a:r>
+              <a:rPr lang="en-US" dirty="0">
+                <a:cs typeface="Calibri"/>
+              </a:rPr>
+              <a:t>The "Pathogen-compatible" structure will allow us to release the plugin to be downloaded via package managers</a:t>
+            </a:r>
+          </a:p>
+          <a:p>
+            <a:r>
+              <a:rPr lang="en-US" dirty="0">
+                <a:cs typeface="Calibri"/>
+              </a:rPr>
+              <a:t>We took the approach of implementing the API in </a:t>
+            </a:r>
+            <a:r>
+              <a:rPr lang="en-US" dirty="0" err="1">
+                <a:cs typeface="Calibri"/>
+              </a:rPr>
+              <a:t>VimScript</a:t>
+            </a:r>
+            <a:r>
+              <a:rPr lang="en-US" dirty="0">
+                <a:cs typeface="Calibri"/>
+              </a:rPr>
+              <a:t> but offloading the heavy lifting to a Python backend </a:t>
+            </a:r>
+          </a:p>
+          <a:p>
+            <a:r>
+              <a:rPr lang="en-US" dirty="0">
+                <a:cs typeface="Calibri"/>
+              </a:rPr>
+              <a:t>This is done in Vim by calling the built-in Vim Python Interpreter which is launched at runtime and available globally to </a:t>
+            </a:r>
+            <a:r>
+              <a:rPr lang="en-US" dirty="0" err="1">
+                <a:cs typeface="Calibri"/>
+              </a:rPr>
+              <a:t>VimScript</a:t>
+            </a:r>
+          </a:p>
+          <a:p>
+            <a:endParaRPr lang="en-US" dirty="0">
+              <a:cs typeface="Calibri"/>
+            </a:endParaRPr>
+          </a:p>
+        </p:txBody>
+      </p:sp>
+      <p:pic>
+        <p:nvPicPr>
+          <p:cNvPr id="6" name="Picture 6" descr="A close up of a logo&#10;&#10;Description generated with high confidence">
+            <a:extLst>
+              <a:ext uri="{FF2B5EF4-FFF2-40B4-BE49-F238E27FC236}">
+                <a16:creationId xmlns:a16="http://schemas.microsoft.com/office/drawing/2014/main" id="{C7259EB8-C098-4341-8566-DA628E023F40}"/>
+              </a:ext>
+            </a:extLst>
+          </p:cNvPr>
+          <p:cNvPicPr>
+            <a:picLocks noChangeAspect="1"/>
+          </p:cNvPicPr>
+          <p:nvPr/>
+        </p:nvPicPr>
+        <p:blipFill>
+          <a:blip r:embed="rId2"/>
+          <a:stretch>
+            <a:fillRect/>
+          </a:stretch>
+        </p:blipFill>
+        <p:spPr>
+          <a:xfrm>
+            <a:off x="1999279" y="4641832"/>
+            <a:ext cx="8115946" cy="2035688"/>
+          </a:xfrm>
+          <a:prstGeom prst="rect">
+            <a:avLst/>
+          </a:prstGeom>
+        </p:spPr>
+      </p:pic>
     </p:spTree>
     <p:extLst>
       <p:ext uri="{BB962C8B-B14F-4D97-AF65-F5344CB8AC3E}">
@@ -3720,16 +4293,20 @@
             <p:ph type="title"/>
           </p:nvPr>
         </p:nvSpPr>
-        <p:spPr/>
-        <p:txBody>
-          <a:bodyPr/>
-          <a:lstStyle/>
-          <a:p>
-            <a:r>
-              <a:rPr lang="en-US" dirty="0" smtClean="0"/>
+        <p:spPr>
+          <a:xfrm>
+            <a:off x="747793" y="132650"/>
+            <a:ext cx="10515600" cy="1325563"/>
+          </a:xfrm>
+        </p:spPr>
+        <p:txBody>
+          <a:bodyPr/>
+          <a:lstStyle/>
+          <a:p>
+            <a:r>
+              <a:rPr lang="en-US" dirty="0"/>
               <a:t>Intercepting File Handling </a:t>
             </a:r>
-            <a:endParaRPr lang="en-US" dirty="0"/>
           </a:p>
         </p:txBody>
       </p:sp>
@@ -3743,15 +4320,136 @@
             <p:ph idx="1"/>
           </p:nvPr>
         </p:nvSpPr>
-        <p:spPr/>
-        <p:txBody>
-          <a:bodyPr/>
-          <a:lstStyle/>
-          <a:p>
-            <a:endParaRPr lang="en-US"/>
-          </a:p>
-        </p:txBody>
-      </p:sp>
+        <p:spPr>
+          <a:xfrm>
+            <a:off x="283230" y="1325400"/>
+            <a:ext cx="6456355" cy="5290681"/>
+          </a:xfrm>
+        </p:spPr>
+        <p:txBody>
+          <a:bodyPr vert="horz" lIns="91440" tIns="45720" rIns="91440" bIns="45720" rtlCol="0" anchor="t">
+            <a:normAutofit/>
+          </a:bodyPr>
+          <a:lstStyle/>
+          <a:p>
+            <a:r>
+              <a:rPr lang="en-US" dirty="0">
+                <a:cs typeface="Calibri"/>
+              </a:rPr>
+              <a:t>For security, we need to ensure all disk reads and writes are done by </a:t>
+            </a:r>
+            <a:r>
+              <a:rPr lang="en-US" dirty="0" err="1">
+                <a:cs typeface="Calibri"/>
+              </a:rPr>
+              <a:t>Vimcryption</a:t>
+            </a:r>
+            <a:endParaRPr lang="en-US" dirty="0" err="1"/>
+          </a:p>
+          <a:p>
+            <a:r>
+              <a:rPr lang="en-US" dirty="0">
+                <a:cs typeface="Calibri"/>
+              </a:rPr>
+              <a:t>Anytime the plugin loads, we disable swap, backup, undo history, and </a:t>
+            </a:r>
+            <a:r>
+              <a:rPr lang="en-US" dirty="0" err="1">
+                <a:cs typeface="Calibri"/>
+              </a:rPr>
+              <a:t>viminfo</a:t>
+            </a:r>
+          </a:p>
+          <a:p>
+            <a:r>
+              <a:rPr lang="en-US" dirty="0">
+                <a:cs typeface="Calibri"/>
+              </a:rPr>
+              <a:t>Vim has </a:t>
+            </a:r>
+            <a:r>
+              <a:rPr lang="en-US" dirty="0" err="1">
+                <a:cs typeface="Calibri"/>
+              </a:rPr>
+              <a:t>builtin</a:t>
+            </a:r>
+            <a:r>
+              <a:rPr lang="en-US" dirty="0">
+                <a:cs typeface="Calibri"/>
+              </a:rPr>
+              <a:t> support for overloading the rest of the file operations via "</a:t>
+            </a:r>
+            <a:r>
+              <a:rPr lang="en-US" dirty="0" err="1">
+                <a:cs typeface="Calibri"/>
+              </a:rPr>
+              <a:t>Cmd</a:t>
+            </a:r>
+            <a:r>
+              <a:rPr lang="en-US" dirty="0">
+                <a:cs typeface="Calibri"/>
+              </a:rPr>
+              <a:t>-Events" </a:t>
+            </a:r>
+          </a:p>
+          <a:p>
+            <a:r>
+              <a:rPr lang="en-US" dirty="0" err="1">
+                <a:cs typeface="Calibri"/>
+              </a:rPr>
+              <a:t>Cmd</a:t>
+            </a:r>
+            <a:r>
+              <a:rPr lang="en-US" dirty="0">
+                <a:cs typeface="Calibri"/>
+              </a:rPr>
+              <a:t>-Events are special callbacks which allow us to replace the built-in file operations with our own callbacks to the </a:t>
+            </a:r>
+            <a:r>
+              <a:rPr lang="en-US" dirty="0" err="1">
+                <a:cs typeface="Calibri"/>
+              </a:rPr>
+              <a:t>Vimcryption</a:t>
+            </a:r>
+            <a:r>
+              <a:rPr lang="en-US" dirty="0">
+                <a:cs typeface="Calibri"/>
+              </a:rPr>
+              <a:t> Python backend</a:t>
+            </a:r>
+          </a:p>
+        </p:txBody>
+      </p:sp>
+      <p:pic>
+        <p:nvPicPr>
+          <p:cNvPr id="4" name="Picture 4" descr="A close up of text on a black background&#10;&#10;Description generated with very high confidence">
+            <a:extLst>
+              <a:ext uri="{FF2B5EF4-FFF2-40B4-BE49-F238E27FC236}">
+                <a16:creationId xmlns:a16="http://schemas.microsoft.com/office/drawing/2014/main" id="{BAF5E98E-C394-45B1-9026-7BAA10055AE4}"/>
+              </a:ext>
+            </a:extLst>
+          </p:cNvPr>
+          <p:cNvPicPr>
+            <a:picLocks noChangeAspect="1"/>
+          </p:cNvPicPr>
+          <p:nvPr/>
+        </p:nvPicPr>
+        <p:blipFill>
+          <a:blip r:embed="rId2"/>
+          <a:stretch>
+            <a:fillRect/>
+          </a:stretch>
+        </p:blipFill>
+        <p:spPr>
+          <a:xfrm>
+            <a:off x="6744963" y="2228476"/>
+            <a:ext cx="5326250" cy="2594776"/>
+          </a:xfrm>
+          <a:prstGeom prst="rect">
+            <a:avLst/>
+          </a:prstGeom>
+        </p:spPr>
+      </p:pic>
     </p:spTree>
     <p:extLst>
       <p:ext uri="{BB962C8B-B14F-4D97-AF65-F5344CB8AC3E}">
@@ -3798,10 +4496,9 @@
           <a:lstStyle/>
           <a:p>
             <a:r>
-              <a:rPr lang="en-US" dirty="0" smtClean="0"/>
+              <a:rPr lang="en-US" dirty="0"/>
               <a:t>The Extensible Encryption Engine</a:t>
             </a:r>
-            <a:endParaRPr lang="en-US" dirty="0"/>
           </a:p>
         </p:txBody>
       </p:sp>
@@ -3817,13 +4514,130 @@
         </p:nvSpPr>
         <p:spPr/>
         <p:txBody>
-          <a:bodyPr/>
-          <a:lstStyle/>
-          <a:p>
-            <a:endParaRPr lang="en-US"/>
-          </a:p>
-        </p:txBody>
-      </p:sp>
+          <a:bodyPr vert="horz" lIns="91440" tIns="45720" rIns="91440" bIns="45720" rtlCol="0" anchor="t">
+            <a:normAutofit/>
+          </a:bodyPr>
+          <a:lstStyle/>
+          <a:p>
+            <a:r>
+              <a:rPr lang="en-US" dirty="0">
+                <a:cs typeface="Calibri"/>
+              </a:rPr>
+              <a:t>To keep up with the cryptographic arms race, any encryption plug in needs to be easy to update and extend.</a:t>
+            </a:r>
+          </a:p>
+          <a:p>
+            <a:r>
+              <a:rPr lang="en-US" dirty="0">
+                <a:cs typeface="Calibri"/>
+              </a:rPr>
+              <a:t>Engine Architecture</a:t>
+            </a:r>
+          </a:p>
+          <a:p>
+            <a:pPr lvl="1"/>
+            <a:r>
+              <a:rPr lang="en-US" dirty="0" err="1">
+                <a:cs typeface="Calibri"/>
+              </a:rPr>
+              <a:t>EncryptionEngine</a:t>
+            </a:r>
+            <a:r>
+              <a:rPr lang="en-US" dirty="0">
+                <a:cs typeface="Calibri"/>
+              </a:rPr>
+              <a:t> – Abstract Base Class</a:t>
+            </a:r>
+          </a:p>
+          <a:p>
+            <a:pPr lvl="2"/>
+            <a:r>
+              <a:rPr lang="en-US" dirty="0">
+                <a:cs typeface="Calibri"/>
+              </a:rPr>
+              <a:t>encrypt</a:t>
+            </a:r>
+          </a:p>
+          <a:p>
+            <a:pPr lvl="2"/>
+            <a:r>
+              <a:rPr lang="en-US" dirty="0">
+                <a:cs typeface="Calibri"/>
+              </a:rPr>
+              <a:t>decrypt</a:t>
+            </a:r>
+          </a:p>
+          <a:p>
+            <a:pPr lvl="1"/>
+            <a:r>
+              <a:rPr lang="en-US" dirty="0" err="1">
+                <a:cs typeface="Calibri"/>
+              </a:rPr>
+              <a:t>BlockCipherEngine</a:t>
+            </a:r>
+            <a:r>
+              <a:rPr lang="en-US" dirty="0">
+                <a:cs typeface="Calibri"/>
+              </a:rPr>
+              <a:t> – Abstract Base Class</a:t>
+            </a:r>
+          </a:p>
+          <a:p>
+            <a:pPr lvl="2"/>
+            <a:r>
+              <a:rPr lang="en-US" dirty="0" err="1">
+                <a:cs typeface="Calibri"/>
+              </a:rPr>
+              <a:t>encrypt_block</a:t>
+            </a:r>
+            <a:endParaRPr lang="en-US" dirty="0">
+              <a:cs typeface="Calibri"/>
+            </a:endParaRPr>
+          </a:p>
+          <a:p>
+            <a:pPr lvl="2"/>
+            <a:r>
+              <a:rPr lang="en-US" dirty="0" err="1">
+                <a:cs typeface="Calibri"/>
+              </a:rPr>
+              <a:t>decrypt_block</a:t>
+            </a:r>
+            <a:endParaRPr lang="en-US" dirty="0">
+              <a:cs typeface="Calibri"/>
+            </a:endParaRPr>
+          </a:p>
+        </p:txBody>
+      </p:sp>
+      <p:pic>
+        <p:nvPicPr>
+          <p:cNvPr id="9" name="Picture 8">
+            <a:extLst>
+              <a:ext uri="{FF2B5EF4-FFF2-40B4-BE49-F238E27FC236}">
+                <a16:creationId xmlns:a16="http://schemas.microsoft.com/office/drawing/2014/main" id="{F9782B02-5624-4FA7-916D-C528F9778849}"/>
+              </a:ext>
+            </a:extLst>
+          </p:cNvPr>
+          <p:cNvPicPr>
+            <a:picLocks noChangeAspect="1"/>
+          </p:cNvPicPr>
+          <p:nvPr/>
+        </p:nvPicPr>
+        <p:blipFill>
+          <a:blip r:embed="rId2"/>
+          <a:stretch>
+            <a:fillRect/>
+          </a:stretch>
+        </p:blipFill>
+        <p:spPr>
+          <a:xfrm>
+            <a:off x="7261005" y="2385849"/>
+            <a:ext cx="3829050" cy="4351282"/>
+          </a:xfrm>
+          <a:prstGeom prst="rect">
+            <a:avLst/>
+          </a:prstGeom>
+        </p:spPr>
+      </p:pic>
     </p:spTree>
     <p:extLst>
       <p:ext uri="{BB962C8B-B14F-4D97-AF65-F5344CB8AC3E}">
@@ -3856,7 +4670,13 @@
       </p:grpSpPr>
       <p:sp>
         <p:nvSpPr>
-          <p:cNvPr id="2" name="Title 1"/>
+          <p:cNvPr id="2" name="Title 1">
+            <a:extLst>
+              <a:ext uri="{FF2B5EF4-FFF2-40B4-BE49-F238E27FC236}">
+                <a16:creationId xmlns:a16="http://schemas.microsoft.com/office/drawing/2014/main" id="{AA993D7A-4FAC-46D8-BE5E-72E62421688A}"/>
+              </a:ext>
+            </a:extLst>
+          </p:cNvPr>
           <p:cNvSpPr>
             <a:spLocks noGrp="1"/>
           </p:cNvSpPr>
@@ -3864,42 +4684,291 @@
             <p:ph type="title"/>
           </p:nvPr>
         </p:nvSpPr>
-        <p:spPr/>
-        <p:txBody>
-          <a:bodyPr/>
-          <a:lstStyle/>
-          <a:p>
-            <a:r>
-              <a:rPr lang="en-US" dirty="0" smtClean="0"/>
-              <a:t>Efficient Text Processing with Generators</a:t>
+        <p:spPr>
+          <a:xfrm>
+            <a:off x="838200" y="103543"/>
+            <a:ext cx="10515600" cy="1325563"/>
+          </a:xfrm>
+        </p:spPr>
+        <p:txBody>
+          <a:bodyPr/>
+          <a:lstStyle/>
+          <a:p>
+            <a:r>
+              <a:rPr lang="en-US" dirty="0">
+                <a:cs typeface="Calibri Light"/>
+              </a:rPr>
+              <a:t>Using the Encryption Engine</a:t>
             </a:r>
             <a:endParaRPr lang="en-US" dirty="0"/>
           </a:p>
         </p:txBody>
       </p:sp>
-      <p:sp>
-        <p:nvSpPr>
-          <p:cNvPr id="3" name="Content Placeholder 2"/>
-          <p:cNvSpPr>
-            <a:spLocks noGrp="1"/>
-          </p:cNvSpPr>
+      <p:pic>
+        <p:nvPicPr>
+          <p:cNvPr id="4" name="Picture 4" descr="A screenshot of a cell phone&#10;&#10;Description generated with very high confidence">
+            <a:extLst>
+              <a:ext uri="{FF2B5EF4-FFF2-40B4-BE49-F238E27FC236}">
+                <a16:creationId xmlns:a16="http://schemas.microsoft.com/office/drawing/2014/main" id="{D4177382-FA95-4CD4-8C7C-498602C92201}"/>
+              </a:ext>
+            </a:extLst>
+          </p:cNvPr>
+          <p:cNvPicPr>
+            <a:picLocks noGrp="1" noChangeAspect="1"/>
+          </p:cNvPicPr>
           <p:nvPr>
             <p:ph idx="1"/>
           </p:nvPr>
-        </p:nvSpPr>
-        <p:spPr/>
-        <p:txBody>
-          <a:bodyPr/>
-          <a:lstStyle/>
-          <a:p>
-            <a:endParaRPr lang="en-US"/>
+        </p:nvPicPr>
+        <p:blipFill>
+          <a:blip r:embed="rId2"/>
+          <a:stretch>
+            <a:fillRect/>
+          </a:stretch>
+        </p:blipFill>
+        <p:spPr>
+          <a:xfrm>
+            <a:off x="1426902" y="3760396"/>
+            <a:ext cx="9315450" cy="2733675"/>
+          </a:xfrm>
+          <a:prstGeom prst="rect">
+            <a:avLst/>
+          </a:prstGeom>
+        </p:spPr>
+      </p:pic>
+      <p:sp>
+        <p:nvSpPr>
+          <p:cNvPr id="7" name="Content Placeholder 2">
+            <a:extLst>
+              <a:ext uri="{FF2B5EF4-FFF2-40B4-BE49-F238E27FC236}">
+                <a16:creationId xmlns:a16="http://schemas.microsoft.com/office/drawing/2014/main" id="{45073025-1A85-4E11-B921-7EC0DA7DFAD2}"/>
+              </a:ext>
+            </a:extLst>
+          </p:cNvPr>
+          <p:cNvSpPr txBox="1">
+            <a:spLocks/>
+          </p:cNvSpPr>
+          <p:nvPr/>
+        </p:nvSpPr>
+        <p:spPr>
+          <a:xfrm>
+            <a:off x="838199" y="1438939"/>
+            <a:ext cx="10515600" cy="4351338"/>
+          </a:xfrm>
+          <a:prstGeom prst="rect">
+            <a:avLst/>
+          </a:prstGeom>
+        </p:spPr>
+        <p:txBody>
+          <a:bodyPr vert="horz" lIns="91440" tIns="45720" rIns="91440" bIns="45720" rtlCol="0" anchor="t">
+            <a:normAutofit/>
+          </a:bodyPr>
+          <a:lstStyle>
+            <a:lvl1pPr marL="228600" indent="-228600" algn="l" defTabSz="914400" rtl="0" eaLnBrk="1" latinLnBrk="0" hangingPunct="1">
+              <a:lnSpc>
+                <a:spcPct val="90000"/>
+              </a:lnSpc>
+              <a:spcBef>
+                <a:spcPts val="1000"/>
+              </a:spcBef>
+              <a:buFont typeface="Arial"/>
+              <a:buChar char="•"/>
+              <a:defRPr sz="2800" kern="1200">
+                <a:solidFill>
+                  <a:schemeClr val="tx1"/>
+                </a:solidFill>
+                <a:latin typeface="+mn-lt"/>
+                <a:ea typeface="+mn-ea"/>
+                <a:cs typeface="+mn-cs"/>
+              </a:defRPr>
+            </a:lvl1pPr>
+            <a:lvl2pPr marL="685800" indent="-228600" algn="l" defTabSz="914400" rtl="0" eaLnBrk="1" latinLnBrk="0" hangingPunct="1">
+              <a:lnSpc>
+                <a:spcPct val="90000"/>
+              </a:lnSpc>
+              <a:spcBef>
+                <a:spcPts val="500"/>
+              </a:spcBef>
+              <a:buFont typeface="Arial"/>
+              <a:buChar char="•"/>
+              <a:defRPr sz="2400" kern="1200">
+                <a:solidFill>
+                  <a:schemeClr val="tx1"/>
+                </a:solidFill>
+                <a:latin typeface="+mn-lt"/>
+                <a:ea typeface="+mn-ea"/>
+                <a:cs typeface="+mn-cs"/>
+              </a:defRPr>
+            </a:lvl2pPr>
+            <a:lvl3pPr marL="1143000" indent="-228600" algn="l" defTabSz="914400" rtl="0" eaLnBrk="1" latinLnBrk="0" hangingPunct="1">
+              <a:lnSpc>
+                <a:spcPct val="90000"/>
+              </a:lnSpc>
+              <a:spcBef>
+                <a:spcPts val="500"/>
+              </a:spcBef>
+              <a:buFont typeface="Arial"/>
+              <a:buChar char="•"/>
+              <a:defRPr sz="2000" kern="1200">
+                <a:solidFill>
+                  <a:schemeClr val="tx1"/>
+                </a:solidFill>
+                <a:latin typeface="+mn-lt"/>
+                <a:ea typeface="+mn-ea"/>
+                <a:cs typeface="+mn-cs"/>
+              </a:defRPr>
+            </a:lvl3pPr>
+            <a:lvl4pPr marL="1600200" indent="-228600" algn="l" defTabSz="914400" rtl="0" eaLnBrk="1" latinLnBrk="0" hangingPunct="1">
+              <a:lnSpc>
+                <a:spcPct val="90000"/>
+              </a:lnSpc>
+              <a:spcBef>
+                <a:spcPts val="500"/>
+              </a:spcBef>
+              <a:buFont typeface="Arial"/>
+              <a:buChar char="•"/>
+              <a:defRPr sz="1800" kern="1200">
+                <a:solidFill>
+                  <a:schemeClr val="tx1"/>
+                </a:solidFill>
+                <a:latin typeface="+mn-lt"/>
+                <a:ea typeface="+mn-ea"/>
+                <a:cs typeface="+mn-cs"/>
+              </a:defRPr>
+            </a:lvl4pPr>
+            <a:lvl5pPr marL="2057400" indent="-228600" algn="l" defTabSz="914400" rtl="0" eaLnBrk="1" latinLnBrk="0" hangingPunct="1">
+              <a:lnSpc>
+                <a:spcPct val="90000"/>
+              </a:lnSpc>
+              <a:spcBef>
+                <a:spcPts val="500"/>
+              </a:spcBef>
+              <a:buFont typeface="Arial"/>
+              <a:buChar char="•"/>
+              <a:defRPr sz="1800" kern="1200">
+                <a:solidFill>
+                  <a:schemeClr val="tx1"/>
+                </a:solidFill>
+                <a:latin typeface="+mn-lt"/>
+                <a:ea typeface="+mn-ea"/>
+                <a:cs typeface="+mn-cs"/>
+              </a:defRPr>
+            </a:lvl5pPr>
+            <a:lvl6pPr marL="2514600" indent="-228600" algn="l" defTabSz="914400" rtl="0" eaLnBrk="1" latinLnBrk="0" hangingPunct="1">
+              <a:lnSpc>
+                <a:spcPct val="90000"/>
+              </a:lnSpc>
+              <a:spcBef>
+                <a:spcPts val="500"/>
+              </a:spcBef>
+              <a:buFont typeface="Arial"/>
+              <a:buChar char="•"/>
+              <a:defRPr sz="1800" kern="1200">
+                <a:solidFill>
+                  <a:schemeClr val="tx1"/>
+                </a:solidFill>
+                <a:latin typeface="+mn-lt"/>
+                <a:ea typeface="+mn-ea"/>
+                <a:cs typeface="+mn-cs"/>
+              </a:defRPr>
+            </a:lvl6pPr>
+            <a:lvl7pPr marL="2971800" indent="-228600" algn="l" defTabSz="914400" rtl="0" eaLnBrk="1" latinLnBrk="0" hangingPunct="1">
+              <a:lnSpc>
+                <a:spcPct val="90000"/>
+              </a:lnSpc>
+              <a:spcBef>
+                <a:spcPts val="500"/>
+              </a:spcBef>
+              <a:buFont typeface="Arial"/>
+              <a:buChar char="•"/>
+              <a:defRPr sz="1800" kern="1200">
+                <a:solidFill>
+                  <a:schemeClr val="tx1"/>
+                </a:solidFill>
+                <a:latin typeface="+mn-lt"/>
+                <a:ea typeface="+mn-ea"/>
+                <a:cs typeface="+mn-cs"/>
+              </a:defRPr>
+            </a:lvl7pPr>
+            <a:lvl8pPr marL="3429000" indent="-228600" algn="l" defTabSz="914400" rtl="0" eaLnBrk="1" latinLnBrk="0" hangingPunct="1">
+              <a:lnSpc>
+                <a:spcPct val="90000"/>
+              </a:lnSpc>
+              <a:spcBef>
+                <a:spcPts val="500"/>
+              </a:spcBef>
+              <a:buFont typeface="Arial"/>
+              <a:buChar char="•"/>
+              <a:defRPr sz="1800" kern="1200">
+                <a:solidFill>
+                  <a:schemeClr val="tx1"/>
+                </a:solidFill>
+                <a:latin typeface="+mn-lt"/>
+                <a:ea typeface="+mn-ea"/>
+                <a:cs typeface="+mn-cs"/>
+              </a:defRPr>
+            </a:lvl8pPr>
+            <a:lvl9pPr marL="3886200" indent="-228600" algn="l" defTabSz="914400" rtl="0" eaLnBrk="1" latinLnBrk="0" hangingPunct="1">
+              <a:lnSpc>
+                <a:spcPct val="90000"/>
+              </a:lnSpc>
+              <a:spcBef>
+                <a:spcPts val="500"/>
+              </a:spcBef>
+              <a:buFont typeface="Arial"/>
+              <a:buChar char="•"/>
+              <a:defRPr sz="1800" kern="1200">
+                <a:solidFill>
+                  <a:schemeClr val="tx1"/>
+                </a:solidFill>
+                <a:latin typeface="+mn-lt"/>
+                <a:ea typeface="+mn-ea"/>
+                <a:cs typeface="+mn-cs"/>
+              </a:defRPr>
+            </a:lvl9pPr>
+          </a:lstStyle>
+          <a:p>
+            <a:r>
+              <a:rPr lang="en-US" dirty="0">
+                <a:cs typeface="Calibri"/>
+              </a:rPr>
+              <a:t>We used the Factory design pattern to dynamically get the correct engine based on the meta-data in the file header</a:t>
+            </a:r>
+          </a:p>
+          <a:p>
+            <a:r>
+              <a:rPr lang="en-US" dirty="0">
+                <a:cs typeface="Calibri"/>
+              </a:rPr>
+              <a:t>Once we have the engine, the code to decrypt a file is only two lines!</a:t>
+            </a:r>
+          </a:p>
+          <a:p>
+            <a:r>
+              <a:rPr lang="en-US" dirty="0">
+                <a:cs typeface="Calibri"/>
+              </a:rPr>
+              <a:t>Eventually we'll bind </a:t>
+            </a:r>
+            <a:r>
+              <a:rPr lang="en-US" dirty="0" err="1">
+                <a:cs typeface="Calibri"/>
+              </a:rPr>
+              <a:t>readHeader</a:t>
+            </a:r>
+            <a:r>
+              <a:rPr lang="en-US" dirty="0">
+                <a:cs typeface="Calibri"/>
+              </a:rPr>
+              <a:t> into the Engine and reduce it to one</a:t>
+            </a:r>
           </a:p>
         </p:txBody>
       </p:sp>
     </p:spTree>
     <p:extLst>
       <p:ext uri="{BB962C8B-B14F-4D97-AF65-F5344CB8AC3E}">
-        <p14:creationId xmlns:p14="http://schemas.microsoft.com/office/powerpoint/2010/main" val="1934422492"/>
+        <p14:creationId xmlns:p14="http://schemas.microsoft.com/office/powerpoint/2010/main" val="99732327"/>
       </p:ext>
     </p:extLst>
   </p:cSld>
@@ -3942,36 +5011,90 @@
           <a:lstStyle/>
           <a:p>
             <a:r>
-              <a:rPr lang="en-US" dirty="0" smtClean="0"/>
-              <a:t>Unit Testing the Engine</a:t>
+              <a:rPr lang="en-US" dirty="0"/>
+              <a:t>Efficient Text Processing with Generators</a:t>
+            </a:r>
+          </a:p>
+        </p:txBody>
+      </p:sp>
+      <p:sp>
+        <p:nvSpPr>
+          <p:cNvPr id="3" name="Content Placeholder 2"/>
+          <p:cNvSpPr>
+            <a:spLocks noGrp="1"/>
+          </p:cNvSpPr>
+          <p:nvPr>
+            <p:ph idx="1"/>
+          </p:nvPr>
+        </p:nvSpPr>
+        <p:spPr/>
+        <p:txBody>
+          <a:bodyPr/>
+          <a:lstStyle/>
+          <a:p>
+            <a:r>
+              <a:rPr lang="en-US" dirty="0"/>
+              <a:t>Text files can be larger than the memory space of our machine.</a:t>
+            </a:r>
+          </a:p>
+          <a:p>
+            <a:r>
+              <a:rPr lang="en-US" dirty="0"/>
+              <a:t>Encryption library doesn’t need to know about everything in the stream at once.</a:t>
+            </a:r>
+          </a:p>
+          <a:p>
+            <a:r>
+              <a:rPr lang="en-US" dirty="0"/>
+              <a:t>Streaming allows more flexibility:</a:t>
+            </a:r>
+          </a:p>
+          <a:p>
+            <a:pPr lvl="1"/>
+            <a:r>
+              <a:rPr lang="en-US" dirty="0"/>
+              <a:t>Network data streams like ftp and </a:t>
+            </a:r>
+            <a:r>
+              <a:rPr lang="en-US" dirty="0" err="1"/>
+              <a:t>ssh</a:t>
             </a:r>
             <a:endParaRPr lang="en-US" dirty="0"/>
           </a:p>
-        </p:txBody>
-      </p:sp>
-      <p:sp>
-        <p:nvSpPr>
-          <p:cNvPr id="3" name="Content Placeholder 2"/>
-          <p:cNvSpPr>
-            <a:spLocks noGrp="1"/>
-          </p:cNvSpPr>
-          <p:nvPr>
-            <p:ph idx="1"/>
-          </p:nvPr>
-        </p:nvSpPr>
-        <p:spPr/>
-        <p:txBody>
-          <a:bodyPr/>
-          <a:lstStyle/>
-          <a:p>
-            <a:endParaRPr lang="en-US"/>
+          <a:p>
+            <a:pPr lvl="1"/>
+            <a:r>
+              <a:rPr lang="en-US" dirty="0"/>
+              <a:t>Terminal input and output (</a:t>
+            </a:r>
+            <a:r>
+              <a:rPr lang="en-US" dirty="0" err="1"/>
+              <a:t>tty</a:t>
+            </a:r>
+            <a:r>
+              <a:rPr lang="en-US" dirty="0"/>
+              <a:t>)</a:t>
+            </a:r>
+          </a:p>
+          <a:p>
+            <a:pPr lvl="1"/>
+            <a:r>
+              <a:rPr lang="en-US" dirty="0"/>
+              <a:t>Live log files</a:t>
+            </a:r>
+          </a:p>
+          <a:p>
+            <a:r>
+              <a:rPr lang="en-US" dirty="0"/>
+              <a:t>Only processes the next character or block.</a:t>
+            </a:r>
           </a:p>
         </p:txBody>
       </p:sp>
     </p:spTree>
     <p:extLst>
       <p:ext uri="{BB962C8B-B14F-4D97-AF65-F5344CB8AC3E}">
-        <p14:creationId xmlns:p14="http://schemas.microsoft.com/office/powerpoint/2010/main" val="1876294336"/>
+        <p14:creationId xmlns:p14="http://schemas.microsoft.com/office/powerpoint/2010/main" val="1934422492"/>
       </p:ext>
     </p:extLst>
   </p:cSld>
@@ -4014,36 +5137,165 @@
           <a:lstStyle/>
           <a:p>
             <a:r>
-              <a:rPr lang="en-US" dirty="0" smtClean="0"/>
-              <a:t>Extending the Testing to Vim Integration </a:t>
+              <a:rPr lang="en-US" dirty="0"/>
+              <a:t>Unit Testing the Engine</a:t>
+            </a:r>
+          </a:p>
+        </p:txBody>
+      </p:sp>
+      <p:sp>
+        <p:nvSpPr>
+          <p:cNvPr id="3" name="Content Placeholder 2"/>
+          <p:cNvSpPr>
+            <a:spLocks noGrp="1"/>
+          </p:cNvSpPr>
+          <p:nvPr>
+            <p:ph idx="1"/>
+          </p:nvPr>
+        </p:nvSpPr>
+        <p:spPr>
+          <a:xfrm>
+            <a:off x="838200" y="1825625"/>
+            <a:ext cx="10515600" cy="4669768"/>
+          </a:xfrm>
+        </p:spPr>
+        <p:txBody>
+          <a:bodyPr>
+            <a:normAutofit fontScale="92500" lnSpcReduction="20000"/>
+          </a:bodyPr>
+          <a:lstStyle/>
+          <a:p>
+            <a:r>
+              <a:rPr lang="en-US" dirty="0"/>
+              <a:t>To ensure stability and to prevent functional regression, we set up </a:t>
+            </a:r>
+            <a:r>
+              <a:rPr lang="en-US" dirty="0" err="1"/>
+              <a:t>unittests</a:t>
+            </a:r>
+            <a:r>
+              <a:rPr lang="en-US" dirty="0"/>
+              <a:t> for the </a:t>
+            </a:r>
+            <a:r>
+              <a:rPr lang="en-US" dirty="0" err="1"/>
+              <a:t>EncryptionEngine</a:t>
+            </a:r>
+            <a:r>
+              <a:rPr lang="en-US" dirty="0"/>
+              <a:t> library.  The tests define and check all engine interfaces to guarantee that passing library code will work with VIM on the first try.</a:t>
+            </a:r>
+          </a:p>
+          <a:p>
+            <a:r>
+              <a:rPr lang="en-US" dirty="0"/>
+              <a:t>Suites</a:t>
+            </a:r>
+          </a:p>
+          <a:p>
+            <a:pPr lvl="1"/>
+            <a:r>
+              <a:rPr lang="en-US" dirty="0" err="1"/>
+              <a:t>TestPassThrough</a:t>
             </a:r>
             <a:endParaRPr lang="en-US" dirty="0"/>
           </a:p>
-        </p:txBody>
-      </p:sp>
-      <p:sp>
-        <p:nvSpPr>
-          <p:cNvPr id="3" name="Content Placeholder 2"/>
-          <p:cNvSpPr>
-            <a:spLocks noGrp="1"/>
-          </p:cNvSpPr>
-          <p:nvPr>
-            <p:ph idx="1"/>
-          </p:nvPr>
-        </p:nvSpPr>
-        <p:spPr/>
-        <p:txBody>
-          <a:bodyPr/>
-          <a:lstStyle/>
-          <a:p>
-            <a:endParaRPr lang="en-US"/>
-          </a:p>
-        </p:txBody>
-      </p:sp>
+          <a:p>
+            <a:pPr lvl="1"/>
+            <a:r>
+              <a:rPr lang="en-US" dirty="0"/>
+              <a:t>TestBase64Engine</a:t>
+            </a:r>
+          </a:p>
+          <a:p>
+            <a:r>
+              <a:rPr lang="en-US" dirty="0"/>
+              <a:t>Tests</a:t>
+            </a:r>
+          </a:p>
+          <a:p>
+            <a:pPr lvl="2"/>
+            <a:r>
+              <a:rPr lang="en-US" dirty="0" err="1"/>
+              <a:t>test_encrypt_str</a:t>
+            </a:r>
+            <a:endParaRPr lang="en-US" dirty="0"/>
+          </a:p>
+          <a:p>
+            <a:pPr lvl="2"/>
+            <a:r>
+              <a:rPr lang="en-US" dirty="0" err="1"/>
+              <a:t>test_encrypt_list</a:t>
+            </a:r>
+            <a:endParaRPr lang="en-US" dirty="0"/>
+          </a:p>
+          <a:p>
+            <a:pPr lvl="2"/>
+            <a:r>
+              <a:rPr lang="en-US" dirty="0" err="1"/>
+              <a:t>test_decrypt_str</a:t>
+            </a:r>
+            <a:endParaRPr lang="en-US" dirty="0"/>
+          </a:p>
+          <a:p>
+            <a:pPr lvl="2"/>
+            <a:r>
+              <a:rPr lang="en-US" dirty="0" err="1"/>
+              <a:t>test_decrypt_list</a:t>
+            </a:r>
+          </a:p>
+          <a:p>
+            <a:pPr lvl="2"/>
+            <a:r>
+              <a:rPr lang="en-US" dirty="0" err="1"/>
+              <a:t>test_readHeader</a:t>
+            </a:r>
+            <a:endParaRPr lang="en-US" dirty="0"/>
+          </a:p>
+          <a:p>
+            <a:pPr lvl="2"/>
+            <a:r>
+              <a:rPr lang="en-US" dirty="0" err="1"/>
+              <a:t>test_writeHeader</a:t>
+            </a:r>
+            <a:endParaRPr lang="en-US" dirty="0"/>
+          </a:p>
+        </p:txBody>
+      </p:sp>
+      <p:pic>
+        <p:nvPicPr>
+          <p:cNvPr id="5" name="Picture 4">
+            <a:extLst>
+              <a:ext uri="{FF2B5EF4-FFF2-40B4-BE49-F238E27FC236}">
+                <a16:creationId xmlns:a16="http://schemas.microsoft.com/office/drawing/2014/main" id="{0FC171DE-300B-4C3E-850D-760FA980F7B3}"/>
+              </a:ext>
+            </a:extLst>
+          </p:cNvPr>
+          <p:cNvPicPr>
+            <a:picLocks noChangeAspect="1"/>
+          </p:cNvPicPr>
+          <p:nvPr/>
+        </p:nvPicPr>
+        <p:blipFill>
+          <a:blip r:embed="rId2"/>
+          <a:stretch>
+            <a:fillRect/>
+          </a:stretch>
+        </p:blipFill>
+        <p:spPr>
+          <a:xfrm>
+            <a:off x="4928366" y="3429000"/>
+            <a:ext cx="6076950" cy="2476500"/>
+          </a:xfrm>
+          <a:prstGeom prst="rect">
+            <a:avLst/>
+          </a:prstGeom>
+        </p:spPr>
+      </p:pic>
     </p:spTree>
     <p:extLst>
       <p:ext uri="{BB962C8B-B14F-4D97-AF65-F5344CB8AC3E}">
-        <p14:creationId xmlns:p14="http://schemas.microsoft.com/office/powerpoint/2010/main" val="1300295011"/>
+        <p14:creationId xmlns:p14="http://schemas.microsoft.com/office/powerpoint/2010/main" val="1876294336"/>
       </p:ext>
     </p:extLst>
   </p:cSld>
@@ -4080,24 +5332,20 @@
             <p:ph type="title"/>
           </p:nvPr>
         </p:nvSpPr>
-        <p:spPr/>
-        <p:txBody>
-          <a:bodyPr/>
-          <a:lstStyle/>
-          <a:p>
-            <a:r>
-              <a:rPr lang="en-US" dirty="0" smtClean="0"/>
-              <a:t>Demo: </a:t>
-            </a:r>
-            <a:r>
-              <a:rPr lang="en-US" dirty="0" err="1" smtClean="0"/>
-              <a:t>Vimcrypt</a:t>
-            </a:r>
-            <a:r>
-              <a:rPr lang="en-US" dirty="0" smtClean="0"/>
-              <a:t>!</a:t>
-            </a:r>
-            <a:endParaRPr lang="en-US" dirty="0"/>
+        <p:spPr>
+          <a:xfrm>
+            <a:off x="838200" y="114916"/>
+            <a:ext cx="10515600" cy="1325563"/>
+          </a:xfrm>
+        </p:spPr>
+        <p:txBody>
+          <a:bodyPr/>
+          <a:lstStyle/>
+          <a:p>
+            <a:r>
+              <a:rPr lang="en-US" dirty="0"/>
+              <a:t>Extending the Testing to Vim Integration </a:t>
+            </a:r>
           </a:p>
         </p:txBody>
       </p:sp>
@@ -4111,19 +5359,77 @@
             <p:ph idx="1"/>
           </p:nvPr>
         </p:nvSpPr>
-        <p:spPr/>
-        <p:txBody>
-          <a:bodyPr/>
-          <a:lstStyle/>
-          <a:p>
-            <a:endParaRPr lang="en-US"/>
-          </a:p>
-        </p:txBody>
-      </p:sp>
+        <p:spPr>
+          <a:xfrm>
+            <a:off x="838200" y="1154610"/>
+            <a:ext cx="10515600" cy="5215696"/>
+          </a:xfrm>
+        </p:spPr>
+        <p:txBody>
+          <a:bodyPr vert="horz" lIns="91440" tIns="45720" rIns="91440" bIns="45720" rtlCol="0" anchor="t">
+            <a:normAutofit/>
+          </a:bodyPr>
+          <a:lstStyle/>
+          <a:p>
+            <a:r>
+              <a:rPr lang="en-US" dirty="0">
+                <a:cs typeface="Calibri"/>
+              </a:rPr>
+              <a:t>To provide integration testing for the plugin, we needed a way to automate the actual usage of the plugin in a Vim instance</a:t>
+            </a:r>
+          </a:p>
+          <a:p>
+            <a:r>
+              <a:rPr lang="en-US" dirty="0">
+                <a:cs typeface="Calibri"/>
+              </a:rPr>
+              <a:t>Vim has an argument "-s" which will execute characters in a file as if they were the result of user keystrokes</a:t>
+            </a:r>
+          </a:p>
+          <a:p>
+            <a:r>
+              <a:rPr lang="en-US" dirty="0">
+                <a:cs typeface="Calibri"/>
+              </a:rPr>
+              <a:t>We were then able to automate the foreground testing we would've done, and do all the verification from a Python based test function</a:t>
+            </a:r>
+          </a:p>
+        </p:txBody>
+      </p:sp>
+      <p:pic>
+        <p:nvPicPr>
+          <p:cNvPr id="4" name="Picture 4">
+            <a:extLst>
+              <a:ext uri="{FF2B5EF4-FFF2-40B4-BE49-F238E27FC236}">
+                <a16:creationId xmlns:a16="http://schemas.microsoft.com/office/drawing/2014/main" id="{54990C2E-8515-4BC8-83FC-DA9E46B889A9}"/>
+              </a:ext>
+            </a:extLst>
+          </p:cNvPr>
+          <p:cNvPicPr>
+            <a:picLocks noChangeAspect="1"/>
+          </p:cNvPicPr>
+          <p:nvPr/>
+        </p:nvPicPr>
+        <p:blipFill>
+          <a:blip r:embed="rId2"/>
+          <a:stretch>
+            <a:fillRect/>
+          </a:stretch>
+        </p:blipFill>
+        <p:spPr>
+          <a:xfrm>
+            <a:off x="2665862" y="3965380"/>
+            <a:ext cx="6848901" cy="2703120"/>
+          </a:xfrm>
+          <a:prstGeom prst="rect">
+            <a:avLst/>
+          </a:prstGeom>
+        </p:spPr>
+      </p:pic>
     </p:spTree>
     <p:extLst>
       <p:ext uri="{BB962C8B-B14F-4D97-AF65-F5344CB8AC3E}">
-        <p14:creationId xmlns:p14="http://schemas.microsoft.com/office/powerpoint/2010/main" val="393091065"/>
+        <p14:creationId xmlns:p14="http://schemas.microsoft.com/office/powerpoint/2010/main" val="1300295011"/>
       </p:ext>
     </p:extLst>
   </p:cSld>

</xml_diff>

<commit_message>
Messed around with some formatting, updated some slides that show the bridge between vim and the engines
</commit_message>
<xml_diff>
--- a/doc/final/FinalPresentation_Vimcryption.pptx
+++ b/doc/final/FinalPresentation_Vimcryption.pptx
@@ -217,7 +217,7 @@
           <a:p>
             <a:fld id="{4149D96D-9ED9-924E-982A-416C235E7FF7}" type="datetimeFigureOut">
               <a:rPr lang="en-US" smtClean="0"/>
-              <a:t>4/22/2018</a:t>
+              <a:t>4/24/18</a:t>
             </a:fld>
             <a:endParaRPr lang="en-US"/>
           </a:p>
@@ -613,7 +613,7 @@
           <a:p>
             <a:fld id="{C67438D2-B45A-C042-B15B-73BAC049D1A3}" type="datetimeFigureOut">
               <a:rPr lang="en-US" smtClean="0"/>
-              <a:t>4/22/2018</a:t>
+              <a:t>4/24/18</a:t>
             </a:fld>
             <a:endParaRPr lang="en-US"/>
           </a:p>
@@ -781,7 +781,7 @@
           <a:p>
             <a:fld id="{C67438D2-B45A-C042-B15B-73BAC049D1A3}" type="datetimeFigureOut">
               <a:rPr lang="en-US" smtClean="0"/>
-              <a:t>4/22/2018</a:t>
+              <a:t>4/24/18</a:t>
             </a:fld>
             <a:endParaRPr lang="en-US"/>
           </a:p>
@@ -954,7 +954,7 @@
           <a:p>
             <a:fld id="{C67438D2-B45A-C042-B15B-73BAC049D1A3}" type="datetimeFigureOut">
               <a:rPr lang="en-US" smtClean="0"/>
-              <a:t>4/22/2018</a:t>
+              <a:t>4/24/18</a:t>
             </a:fld>
             <a:endParaRPr lang="en-US"/>
           </a:p>
@@ -1122,7 +1122,7 @@
           <a:p>
             <a:fld id="{C67438D2-B45A-C042-B15B-73BAC049D1A3}" type="datetimeFigureOut">
               <a:rPr lang="en-US" smtClean="0"/>
-              <a:t>4/22/2018</a:t>
+              <a:t>4/24/18</a:t>
             </a:fld>
             <a:endParaRPr lang="en-US"/>
           </a:p>
@@ -1362,7 +1362,7 @@
           <a:p>
             <a:fld id="{C67438D2-B45A-C042-B15B-73BAC049D1A3}" type="datetimeFigureOut">
               <a:rPr lang="en-US" smtClean="0"/>
-              <a:t>4/22/2018</a:t>
+              <a:t>4/24/18</a:t>
             </a:fld>
             <a:endParaRPr lang="en-US"/>
           </a:p>
@@ -1591,7 +1591,7 @@
           <a:p>
             <a:fld id="{C67438D2-B45A-C042-B15B-73BAC049D1A3}" type="datetimeFigureOut">
               <a:rPr lang="en-US" smtClean="0"/>
-              <a:t>4/22/2018</a:t>
+              <a:t>4/24/18</a:t>
             </a:fld>
             <a:endParaRPr lang="en-US"/>
           </a:p>
@@ -1955,7 +1955,7 @@
           <a:p>
             <a:fld id="{C67438D2-B45A-C042-B15B-73BAC049D1A3}" type="datetimeFigureOut">
               <a:rPr lang="en-US" smtClean="0"/>
-              <a:t>4/22/2018</a:t>
+              <a:t>4/24/18</a:t>
             </a:fld>
             <a:endParaRPr lang="en-US"/>
           </a:p>
@@ -2072,7 +2072,7 @@
           <a:p>
             <a:fld id="{C67438D2-B45A-C042-B15B-73BAC049D1A3}" type="datetimeFigureOut">
               <a:rPr lang="en-US" smtClean="0"/>
-              <a:t>4/22/2018</a:t>
+              <a:t>4/24/18</a:t>
             </a:fld>
             <a:endParaRPr lang="en-US"/>
           </a:p>
@@ -2162,7 +2162,7 @@
           <a:p>
             <a:fld id="{C67438D2-B45A-C042-B15B-73BAC049D1A3}" type="datetimeFigureOut">
               <a:rPr lang="en-US" smtClean="0"/>
-              <a:t>4/22/2018</a:t>
+              <a:t>4/24/18</a:t>
             </a:fld>
             <a:endParaRPr lang="en-US"/>
           </a:p>
@@ -2437,7 +2437,7 @@
           <a:p>
             <a:fld id="{C67438D2-B45A-C042-B15B-73BAC049D1A3}" type="datetimeFigureOut">
               <a:rPr lang="en-US" smtClean="0"/>
-              <a:t>4/22/2018</a:t>
+              <a:t>4/24/18</a:t>
             </a:fld>
             <a:endParaRPr lang="en-US"/>
           </a:p>
@@ -2689,7 +2689,7 @@
           <a:p>
             <a:fld id="{C67438D2-B45A-C042-B15B-73BAC049D1A3}" type="datetimeFigureOut">
               <a:rPr lang="en-US" smtClean="0"/>
-              <a:t>4/22/2018</a:t>
+              <a:t>4/24/18</a:t>
             </a:fld>
             <a:endParaRPr lang="en-US"/>
           </a:p>
@@ -2925,7 +2925,7 @@
           <a:p>
             <a:fld id="{C67438D2-B45A-C042-B15B-73BAC049D1A3}" type="datetimeFigureOut">
               <a:rPr lang="en-US" smtClean="0"/>
-              <a:t>4/22/2018</a:t>
+              <a:t>4/24/18</a:t>
             </a:fld>
             <a:endParaRPr lang="en-US"/>
           </a:p>
@@ -3482,7 +3482,12 @@
             <p:ph type="title"/>
           </p:nvPr>
         </p:nvSpPr>
-        <p:spPr/>
+        <p:spPr>
+          <a:xfrm>
+            <a:off x="838200" y="94781"/>
+            <a:ext cx="10515600" cy="1325563"/>
+          </a:xfrm>
+        </p:spPr>
         <p:txBody>
           <a:bodyPr/>
           <a:lstStyle/>
@@ -3512,7 +3517,7 @@
         </p:spPr>
         <p:txBody>
           <a:bodyPr vert="horz" lIns="91440" tIns="45720" rIns="91440" bIns="45720" rtlCol="0" anchor="t">
-            <a:normAutofit/>
+            <a:normAutofit fontScale="92500" lnSpcReduction="10000"/>
           </a:bodyPr>
           <a:lstStyle/>
           <a:p>
@@ -3532,16 +3537,44 @@
               <a:rPr lang="en-US" dirty="0">
                 <a:cs typeface="Calibri"/>
               </a:rPr>
-              <a:t>! Look for the project on vimawesome.com!</a:t>
-            </a:r>
+              <a:t>! Look for the project on </a:t>
+            </a:r>
+            <a:r>
+              <a:rPr lang="en-US" dirty="0" err="1">
+                <a:cs typeface="Calibri"/>
+              </a:rPr>
+              <a:t>vimawesome.com</a:t>
+            </a:r>
+            <a:r>
+              <a:rPr lang="en-US" dirty="0" smtClean="0">
+                <a:cs typeface="Calibri"/>
+              </a:rPr>
+              <a:t>!</a:t>
+            </a:r>
+          </a:p>
+          <a:p>
+            <a:endParaRPr lang="en-US" dirty="0">
+              <a:cs typeface="Calibri"/>
+            </a:endParaRPr>
           </a:p>
           <a:p>
             <a:r>
               <a:rPr lang="en-US" dirty="0">
                 <a:cs typeface="Calibri"/>
               </a:rPr>
-              <a:t>Learned a lot about the practical implications of security when dealing with File System Operations and text editing</a:t>
-            </a:r>
+              <a:t>Learned a lot about the practical implications of security when dealing with File System Operations and text </a:t>
+            </a:r>
+            <a:r>
+              <a:rPr lang="en-US" dirty="0" smtClean="0">
+                <a:cs typeface="Calibri"/>
+              </a:rPr>
+              <a:t>editing</a:t>
+            </a:r>
+          </a:p>
+          <a:p>
+            <a:endParaRPr lang="en-US" dirty="0">
+              <a:cs typeface="Calibri"/>
+            </a:endParaRPr>
           </a:p>
           <a:p>
             <a:r>
@@ -3550,6 +3583,14 @@
               </a:rPr>
               <a:t>We want to continue development, eventually supporting asymmetric key encryption so you can easily share files with your friends </a:t>
             </a:r>
+            <a:endParaRPr lang="en-US" dirty="0" smtClean="0">
+              <a:cs typeface="Calibri"/>
+            </a:endParaRPr>
+          </a:p>
+          <a:p>
+            <a:endParaRPr lang="en-US" dirty="0">
+              <a:cs typeface="Calibri"/>
+            </a:endParaRPr>
           </a:p>
           <a:p>
             <a:r>
@@ -3684,7 +3725,7 @@
           <p:cNvPr id="2" name="Title 1">
             <a:extLst>
               <a:ext uri="{FF2B5EF4-FFF2-40B4-BE49-F238E27FC236}">
-                <a16:creationId xmlns:a16="http://schemas.microsoft.com/office/drawing/2014/main" id="{6242C91B-FBD6-4894-9004-4C4011B6F17C}"/>
+                <a16:creationId xmlns:a16="http://schemas.microsoft.com/office/drawing/2014/main" xmlns="" id="{6242C91B-FBD6-4894-9004-4C4011B6F17C}"/>
               </a:ext>
             </a:extLst>
           </p:cNvPr>
@@ -3715,7 +3756,7 @@
           <p:cNvPr id="3" name="Content Placeholder 2">
             <a:extLst>
               <a:ext uri="{FF2B5EF4-FFF2-40B4-BE49-F238E27FC236}">
-                <a16:creationId xmlns:a16="http://schemas.microsoft.com/office/drawing/2014/main" id="{08DDA793-83A7-483E-BBB9-833D9EDD7621}"/>
+                <a16:creationId xmlns:a16="http://schemas.microsoft.com/office/drawing/2014/main" xmlns="" id="{08DDA793-83A7-483E-BBB9-833D9EDD7621}"/>
               </a:ext>
             </a:extLst>
           </p:cNvPr>
@@ -3955,7 +3996,12 @@
             <p:ph type="title"/>
           </p:nvPr>
         </p:nvSpPr>
-        <p:spPr/>
+        <p:spPr>
+          <a:xfrm>
+            <a:off x="838200" y="110683"/>
+            <a:ext cx="10515600" cy="1325563"/>
+          </a:xfrm>
+        </p:spPr>
         <p:txBody>
           <a:bodyPr/>
           <a:lstStyle/>
@@ -3985,7 +4031,7 @@
         </p:spPr>
         <p:txBody>
           <a:bodyPr vert="horz" lIns="91440" tIns="45720" rIns="91440" bIns="45720" rtlCol="0" anchor="t">
-            <a:normAutofit/>
+            <a:normAutofit fontScale="92500" lnSpcReduction="10000"/>
           </a:bodyPr>
           <a:lstStyle/>
           <a:p>
@@ -4000,7 +4046,14 @@
                 <a:cs typeface="Calibri"/>
                 <a:hlinkClick r:id="rId2"/>
               </a:rPr>
-              <a:t>https://stackoverflow.blog/2017/05/23/stack-overflow-helping-one-million-developers-exit-vim/</a:t>
+              <a:t>https://stackoverflow.blog/2017/05/23/stack-overflow-helping-one-million-developers-exit-vim</a:t>
+            </a:r>
+            <a:r>
+              <a:rPr lang="en-US" dirty="0" smtClean="0">
+                <a:cs typeface="Calibri"/>
+                <a:hlinkClick r:id="rId2"/>
+              </a:rPr>
+              <a:t>/ </a:t>
             </a:r>
             <a:r>
               <a:rPr lang="en-US" dirty="0">
@@ -4008,14 +4061,33 @@
               </a:rPr>
               <a:t>)</a:t>
             </a:r>
+            <a:endParaRPr lang="en-US" dirty="0" smtClean="0">
+              <a:cs typeface="Calibri"/>
+            </a:endParaRPr>
+          </a:p>
+          <a:p>
+            <a:endParaRPr lang="en-US" dirty="0">
+              <a:cs typeface="Calibri"/>
+            </a:endParaRPr>
           </a:p>
           <a:p>
             <a:r>
               <a:rPr lang="en-US" dirty="0">
                 <a:cs typeface="Calibri"/>
               </a:rPr>
-              <a:t>Very extensible (and with Python!)</a:t>
-            </a:r>
+              <a:t>Very extensible (and with Python</a:t>
+            </a:r>
+            <a:r>
+              <a:rPr lang="en-US" dirty="0" smtClean="0">
+                <a:cs typeface="Calibri"/>
+              </a:rPr>
+              <a:t>!)</a:t>
+            </a:r>
+          </a:p>
+          <a:p>
+            <a:endParaRPr lang="en-US" dirty="0">
+              <a:cs typeface="Calibri"/>
+            </a:endParaRPr>
           </a:p>
           <a:p>
             <a:r>
@@ -4050,17 +4122,28 @@
             </a:r>
           </a:p>
           <a:p>
-            <a:r>
-              <a:rPr lang="en-US" dirty="0" err="1">
+            <a:endParaRPr lang="en-US" dirty="0" smtClean="0">
+              <a:cs typeface="Calibri"/>
+            </a:endParaRPr>
+          </a:p>
+          <a:p>
+            <a:r>
+              <a:rPr lang="en-US" dirty="0" err="1" smtClean="0">
                 <a:cs typeface="Calibri"/>
               </a:rPr>
               <a:t>Vimcryption</a:t>
             </a:r>
             <a:r>
+              <a:rPr lang="en-US" dirty="0" smtClean="0">
+                <a:cs typeface="Calibri"/>
+              </a:rPr>
+              <a:t> </a:t>
+            </a:r>
+            <a:r>
               <a:rPr lang="en-US" dirty="0">
                 <a:cs typeface="Calibri"/>
               </a:rPr>
-              <a:t> makes a good foundation for a long term open-source project</a:t>
+              <a:t>makes a good foundation for a long term open-source project</a:t>
             </a:r>
           </a:p>
           <a:p>
@@ -4144,8 +4227,8 @@
         </p:nvSpPr>
         <p:spPr>
           <a:xfrm>
-            <a:off x="838200" y="1347760"/>
-            <a:ext cx="10838482" cy="4738796"/>
+            <a:off x="500932" y="1347760"/>
+            <a:ext cx="11175750" cy="3216289"/>
           </a:xfrm>
         </p:spPr>
         <p:txBody>
@@ -4155,48 +4238,66 @@
           <a:lstStyle/>
           <a:p>
             <a:r>
-              <a:rPr lang="en-US" dirty="0">
+              <a:rPr lang="en-US" sz="2600" dirty="0">
                 <a:cs typeface="Calibri"/>
               </a:rPr>
               <a:t>Vim Plugins are written in </a:t>
             </a:r>
             <a:r>
-              <a:rPr lang="en-US" dirty="0" err="1">
+              <a:rPr lang="en-US" sz="2600" dirty="0" err="1">
                 <a:cs typeface="Calibri"/>
               </a:rPr>
               <a:t>VimScript</a:t>
             </a:r>
             <a:r>
-              <a:rPr lang="en-US" dirty="0">
-                <a:cs typeface="Calibri"/>
-              </a:rPr>
-              <a:t> with a common structure</a:t>
-            </a:r>
-            <a:endParaRPr lang="en-US" dirty="0"/>
-          </a:p>
-          <a:p>
-            <a:r>
-              <a:rPr lang="en-US" dirty="0">
-                <a:cs typeface="Calibri"/>
-              </a:rPr>
-              <a:t>The "Pathogen-compatible" structure will allow us to release the plugin to be downloaded via package managers</a:t>
-            </a:r>
-          </a:p>
-          <a:p>
-            <a:r>
-              <a:rPr lang="en-US" dirty="0">
-                <a:cs typeface="Calibri"/>
-              </a:rPr>
-              <a:t>We took the approach of implementing the API in </a:t>
-            </a:r>
-            <a:r>
-              <a:rPr lang="en-US" dirty="0" err="1">
+              <a:rPr lang="en-US" sz="2600" dirty="0">
+                <a:cs typeface="Calibri"/>
+              </a:rPr>
+              <a:t> with a common </a:t>
+            </a:r>
+            <a:r>
+              <a:rPr lang="en-US" sz="2600" dirty="0" smtClean="0">
+                <a:cs typeface="Calibri"/>
+              </a:rPr>
+              <a:t>structure</a:t>
+            </a:r>
+            <a:endParaRPr lang="en-US" sz="2600" dirty="0"/>
+          </a:p>
+          <a:p>
+            <a:r>
+              <a:rPr lang="en-US" sz="2600" dirty="0">
+                <a:cs typeface="Calibri"/>
+              </a:rPr>
+              <a:t>The "Pathogen-compatible" structure </a:t>
+            </a:r>
+            <a:r>
+              <a:rPr lang="en-US" sz="2600" dirty="0" smtClean="0">
+                <a:cs typeface="Calibri"/>
+              </a:rPr>
+              <a:t>is used by all Vim Package Managers</a:t>
+            </a:r>
+          </a:p>
+          <a:p>
+            <a:r>
+              <a:rPr lang="en-US" sz="2600" dirty="0" smtClean="0">
+                <a:cs typeface="Calibri"/>
+              </a:rPr>
+              <a:t>We </a:t>
+            </a:r>
+            <a:r>
+              <a:rPr lang="en-US" sz="2600" dirty="0">
+                <a:cs typeface="Calibri"/>
+              </a:rPr>
+              <a:t>took the approach of implementing the API in </a:t>
+            </a:r>
+            <a:r>
+              <a:rPr lang="en-US" sz="2600" dirty="0" err="1">
                 <a:cs typeface="Calibri"/>
               </a:rPr>
               <a:t>VimScript</a:t>
             </a:r>
             <a:r>
-              <a:rPr lang="en-US" dirty="0">
+              <a:rPr lang="en-US" sz="2600" dirty="0">
                 <a:cs typeface="Calibri"/>
               </a:rPr>
               <a:t> but offloading the heavy lifting to a Python backend </a:t>
@@ -4204,20 +4305,20 @@
           </a:p>
           <a:p>
             <a:r>
-              <a:rPr lang="en-US" dirty="0">
+              <a:rPr lang="en-US" sz="2600" dirty="0">
                 <a:cs typeface="Calibri"/>
               </a:rPr>
               <a:t>This is done in Vim by calling the built-in Vim Python Interpreter which is launched at runtime and available globally to </a:t>
             </a:r>
             <a:r>
-              <a:rPr lang="en-US" dirty="0" err="1">
+              <a:rPr lang="en-US" sz="2600" dirty="0" err="1">
                 <a:cs typeface="Calibri"/>
               </a:rPr>
               <a:t>VimScript</a:t>
             </a:r>
           </a:p>
           <a:p>
-            <a:endParaRPr lang="en-US" dirty="0">
+            <a:endParaRPr lang="en-US" sz="2600" dirty="0">
               <a:cs typeface="Calibri"/>
             </a:endParaRPr>
           </a:p>
@@ -4228,7 +4329,7 @@
           <p:cNvPr id="6" name="Picture 6" descr="A close up of a logo&#10;&#10;Description generated with high confidence">
             <a:extLst>
               <a:ext uri="{FF2B5EF4-FFF2-40B4-BE49-F238E27FC236}">
-                <a16:creationId xmlns:a16="http://schemas.microsoft.com/office/drawing/2014/main" id="{C7259EB8-C098-4341-8566-DA628E023F40}"/>
+                <a16:creationId xmlns:a16="http://schemas.microsoft.com/office/drawing/2014/main" xmlns="" id="{C7259EB8-C098-4341-8566-DA628E023F40}"/>
               </a:ext>
             </a:extLst>
           </p:cNvPr>
@@ -4245,7 +4346,7 @@
         </p:blipFill>
         <p:spPr>
           <a:xfrm>
-            <a:off x="1999279" y="4641832"/>
+            <a:off x="2030834" y="4403293"/>
             <a:ext cx="8115946" cy="2035688"/>
           </a:xfrm>
           <a:prstGeom prst="rect">
@@ -4333,102 +4434,107 @@
           <a:lstStyle/>
           <a:p>
             <a:r>
-              <a:rPr lang="en-US" dirty="0">
+              <a:rPr lang="en-US" sz="2600" dirty="0">
                 <a:cs typeface="Calibri"/>
               </a:rPr>
               <a:t>For security, we need to ensure all disk reads and writes are done by </a:t>
             </a:r>
             <a:r>
-              <a:rPr lang="en-US" dirty="0" err="1">
+              <a:rPr lang="en-US" sz="2600" dirty="0" err="1" smtClean="0">
                 <a:cs typeface="Calibri"/>
               </a:rPr>
               <a:t>Vimcryption</a:t>
             </a:r>
-            <a:endParaRPr lang="en-US" dirty="0" err="1"/>
-          </a:p>
-          <a:p>
-            <a:r>
-              <a:rPr lang="en-US" dirty="0">
+            <a:endParaRPr lang="en-US" sz="2600" dirty="0"/>
+          </a:p>
+          <a:p>
+            <a:r>
+              <a:rPr lang="en-US" sz="2600" dirty="0">
                 <a:cs typeface="Calibri"/>
               </a:rPr>
               <a:t>Anytime the plugin loads, we disable swap, backup, undo history, and </a:t>
             </a:r>
             <a:r>
-              <a:rPr lang="en-US" dirty="0" err="1">
+              <a:rPr lang="en-US" sz="2600" dirty="0" err="1" smtClean="0">
                 <a:cs typeface="Calibri"/>
               </a:rPr>
               <a:t>viminfo</a:t>
             </a:r>
-          </a:p>
-          <a:p>
-            <a:r>
-              <a:rPr lang="en-US" dirty="0">
-                <a:cs typeface="Calibri"/>
-              </a:rPr>
-              <a:t>Vim has </a:t>
-            </a:r>
-            <a:r>
-              <a:rPr lang="en-US" dirty="0" err="1">
-                <a:cs typeface="Calibri"/>
-              </a:rPr>
-              <a:t>builtin</a:t>
-            </a:r>
-            <a:r>
-              <a:rPr lang="en-US" dirty="0">
-                <a:cs typeface="Calibri"/>
-              </a:rPr>
-              <a:t> support for overloading the rest of the file operations via "</a:t>
-            </a:r>
-            <a:r>
-              <a:rPr lang="en-US" dirty="0" err="1">
+            <a:endParaRPr lang="en-US" sz="2600" dirty="0" smtClean="0">
+              <a:cs typeface="Calibri"/>
+            </a:endParaRPr>
+          </a:p>
+          <a:p>
+            <a:r>
+              <a:rPr lang="en-US" sz="2600" dirty="0" smtClean="0">
+                <a:cs typeface="Calibri"/>
+              </a:rPr>
+              <a:t>Vim Plugins are built on callback registrations via “Auto-</a:t>
+            </a:r>
+            <a:r>
+              <a:rPr lang="en-US" sz="2600" dirty="0" err="1" smtClean="0">
+                <a:cs typeface="Calibri"/>
+              </a:rPr>
+              <a:t>Cmds</a:t>
+            </a:r>
+            <a:r>
+              <a:rPr lang="en-US" sz="2600" dirty="0" smtClean="0">
+                <a:cs typeface="Calibri"/>
+              </a:rPr>
+              <a:t>”</a:t>
+            </a:r>
+            <a:endParaRPr lang="en-US" sz="2600" dirty="0">
+              <a:cs typeface="Calibri"/>
+            </a:endParaRPr>
+          </a:p>
+          <a:p>
+            <a:r>
+              <a:rPr lang="en-US" sz="2600" dirty="0" smtClean="0">
+                <a:cs typeface="Calibri"/>
+              </a:rPr>
+              <a:t>“</a:t>
+            </a:r>
+            <a:r>
+              <a:rPr lang="en-US" sz="2600" dirty="0" err="1" smtClean="0">
                 <a:cs typeface="Calibri"/>
               </a:rPr>
               <a:t>Cmd</a:t>
             </a:r>
             <a:r>
-              <a:rPr lang="en-US" dirty="0">
-                <a:cs typeface="Calibri"/>
-              </a:rPr>
-              <a:t>-Events" </a:t>
-            </a:r>
-          </a:p>
-          <a:p>
-            <a:r>
-              <a:rPr lang="en-US" dirty="0" err="1">
-                <a:cs typeface="Calibri"/>
-              </a:rPr>
-              <a:t>Cmd</a:t>
-            </a:r>
-            <a:r>
-              <a:rPr lang="en-US" dirty="0">
-                <a:cs typeface="Calibri"/>
-              </a:rPr>
-              <a:t>-Events are special callbacks which allow us to replace the built-in file operations with our own callbacks to the </a:t>
-            </a:r>
-            <a:r>
-              <a:rPr lang="en-US" dirty="0" err="1">
-                <a:cs typeface="Calibri"/>
-              </a:rPr>
-              <a:t>Vimcryption</a:t>
-            </a:r>
-            <a:r>
-              <a:rPr lang="en-US" dirty="0">
-                <a:cs typeface="Calibri"/>
-              </a:rPr>
-              <a:t> Python backend</a:t>
-            </a:r>
+              <a:rPr lang="en-US" sz="2600" dirty="0" smtClean="0">
+                <a:cs typeface="Calibri"/>
+              </a:rPr>
+              <a:t>-Events” </a:t>
+            </a:r>
+            <a:r>
+              <a:rPr lang="en-US" sz="2600" dirty="0">
+                <a:cs typeface="Calibri"/>
+              </a:rPr>
+              <a:t>are special </a:t>
+            </a:r>
+            <a:r>
+              <a:rPr lang="en-US" sz="2600" dirty="0" smtClean="0">
+                <a:cs typeface="Calibri"/>
+              </a:rPr>
+              <a:t>callbacks which allow the overloading of File Operations</a:t>
+            </a:r>
+          </a:p>
+          <a:p>
+            <a:r>
+              <a:rPr lang="en-US" sz="2600" dirty="0" smtClean="0">
+                <a:cs typeface="Calibri"/>
+              </a:rPr>
+              <a:t>We bound these file operation callbacks to our Python backend via our File Handler</a:t>
+            </a:r>
+            <a:endParaRPr lang="en-US" sz="2600" dirty="0">
+              <a:cs typeface="Calibri"/>
+            </a:endParaRPr>
           </a:p>
         </p:txBody>
       </p:sp>
       <p:pic>
         <p:nvPicPr>
-          <p:cNvPr id="4" name="Picture 4" descr="A close up of text on a black background&#10;&#10;Description generated with very high confidence">
-            <a:extLst>
-              <a:ext uri="{FF2B5EF4-FFF2-40B4-BE49-F238E27FC236}">
-                <a16:creationId xmlns:a16="http://schemas.microsoft.com/office/drawing/2014/main" id="{BAF5E98E-C394-45B1-9026-7BAA10055AE4}"/>
-              </a:ext>
-            </a:extLst>
-          </p:cNvPr>
+          <p:cNvPr id="5" name="Picture 4"/>
           <p:cNvPicPr>
             <a:picLocks noChangeAspect="1"/>
           </p:cNvPicPr>
@@ -4442,8 +4548,8 @@
         </p:blipFill>
         <p:spPr>
           <a:xfrm>
-            <a:off x="6744963" y="2228476"/>
-            <a:ext cx="5326250" cy="2594776"/>
+            <a:off x="6923609" y="1325400"/>
+            <a:ext cx="5053541" cy="4211284"/>
           </a:xfrm>
           <a:prstGeom prst="rect">
             <a:avLst/>
@@ -4613,7 +4719,7 @@
           <p:cNvPr id="9" name="Picture 8">
             <a:extLst>
               <a:ext uri="{FF2B5EF4-FFF2-40B4-BE49-F238E27FC236}">
-                <a16:creationId xmlns:a16="http://schemas.microsoft.com/office/drawing/2014/main" id="{F9782B02-5624-4FA7-916D-C528F9778849}"/>
+                <a16:creationId xmlns:a16="http://schemas.microsoft.com/office/drawing/2014/main" xmlns="" id="{F9782B02-5624-4FA7-916D-C528F9778849}"/>
               </a:ext>
             </a:extLst>
           </p:cNvPr>
@@ -4673,7 +4779,7 @@
           <p:cNvPr id="2" name="Title 1">
             <a:extLst>
               <a:ext uri="{FF2B5EF4-FFF2-40B4-BE49-F238E27FC236}">
-                <a16:creationId xmlns:a16="http://schemas.microsoft.com/office/drawing/2014/main" id="{AA993D7A-4FAC-46D8-BE5E-72E62421688A}"/>
+                <a16:creationId xmlns:a16="http://schemas.microsoft.com/office/drawing/2014/main" xmlns="" id="{AA993D7A-4FAC-46D8-BE5E-72E62421688A}"/>
               </a:ext>
             </a:extLst>
           </p:cNvPr>
@@ -4686,7 +4792,7 @@
         </p:nvSpPr>
         <p:spPr>
           <a:xfrm>
-            <a:off x="838200" y="103543"/>
+            <a:off x="838200" y="0"/>
             <a:ext cx="10515600" cy="1325563"/>
           </a:xfrm>
         </p:spPr>
@@ -4704,44 +4810,12 @@
           </a:p>
         </p:txBody>
       </p:sp>
-      <p:pic>
-        <p:nvPicPr>
-          <p:cNvPr id="4" name="Picture 4" descr="A screenshot of a cell phone&#10;&#10;Description generated with very high confidence">
-            <a:extLst>
-              <a:ext uri="{FF2B5EF4-FFF2-40B4-BE49-F238E27FC236}">
-                <a16:creationId xmlns:a16="http://schemas.microsoft.com/office/drawing/2014/main" id="{D4177382-FA95-4CD4-8C7C-498602C92201}"/>
-              </a:ext>
-            </a:extLst>
-          </p:cNvPr>
-          <p:cNvPicPr>
-            <a:picLocks noGrp="1" noChangeAspect="1"/>
-          </p:cNvPicPr>
-          <p:nvPr>
-            <p:ph idx="1"/>
-          </p:nvPr>
-        </p:nvPicPr>
-        <p:blipFill>
-          <a:blip r:embed="rId2"/>
-          <a:stretch>
-            <a:fillRect/>
-          </a:stretch>
-        </p:blipFill>
-        <p:spPr>
-          <a:xfrm>
-            <a:off x="1426902" y="3760396"/>
-            <a:ext cx="9315450" cy="2733675"/>
-          </a:xfrm>
-          <a:prstGeom prst="rect">
-            <a:avLst/>
-          </a:prstGeom>
-        </p:spPr>
-      </p:pic>
       <p:sp>
         <p:nvSpPr>
           <p:cNvPr id="7" name="Content Placeholder 2">
             <a:extLst>
               <a:ext uri="{FF2B5EF4-FFF2-40B4-BE49-F238E27FC236}">
-                <a16:creationId xmlns:a16="http://schemas.microsoft.com/office/drawing/2014/main" id="{45073025-1A85-4E11-B921-7EC0DA7DFAD2}"/>
+                <a16:creationId xmlns:a16="http://schemas.microsoft.com/office/drawing/2014/main" xmlns="" id="{45073025-1A85-4E11-B921-7EC0DA7DFAD2}"/>
               </a:ext>
             </a:extLst>
           </p:cNvPr>
@@ -4752,7 +4826,7 @@
         </p:nvSpPr>
         <p:spPr>
           <a:xfrm>
-            <a:off x="838199" y="1438939"/>
+            <a:off x="838200" y="1279913"/>
             <a:ext cx="10515600" cy="4351338"/>
           </a:xfrm>
           <a:prstGeom prst="rect">
@@ -4929,42 +5003,111 @@
           </a:lstStyle>
           <a:p>
             <a:r>
-              <a:rPr lang="en-US" dirty="0">
-                <a:cs typeface="Calibri"/>
-              </a:rPr>
-              <a:t>We used the Factory design pattern to dynamically get the correct engine based on the meta-data in the file header</a:t>
-            </a:r>
-          </a:p>
-          <a:p>
-            <a:r>
-              <a:rPr lang="en-US" dirty="0">
-                <a:cs typeface="Calibri"/>
-              </a:rPr>
-              <a:t>Once we have the engine, the code to decrypt a file is only two lines!</a:t>
-            </a:r>
-          </a:p>
-          <a:p>
-            <a:r>
-              <a:rPr lang="en-US" dirty="0">
-                <a:cs typeface="Calibri"/>
-              </a:rPr>
-              <a:t>Eventually we'll bind </a:t>
-            </a:r>
-            <a:r>
-              <a:rPr lang="en-US" dirty="0" err="1">
-                <a:cs typeface="Calibri"/>
-              </a:rPr>
-              <a:t>readHeader</a:t>
-            </a:r>
-            <a:r>
-              <a:rPr lang="en-US" dirty="0">
-                <a:cs typeface="Calibri"/>
-              </a:rPr>
-              <a:t> into the Engine and reduce it to one</a:t>
-            </a:r>
-          </a:p>
-        </p:txBody>
-      </p:sp>
+              <a:rPr lang="en-US" sz="2600" dirty="0">
+                <a:cs typeface="Calibri"/>
+              </a:rPr>
+              <a:t>We used the Factory design pattern to dynamically get the correct engine based on the meta-data in the file </a:t>
+            </a:r>
+            <a:r>
+              <a:rPr lang="en-US" sz="2600" dirty="0" smtClean="0">
+                <a:cs typeface="Calibri"/>
+              </a:rPr>
+              <a:t>header</a:t>
+            </a:r>
+          </a:p>
+          <a:p>
+            <a:r>
+              <a:rPr lang="en-US" sz="2600" dirty="0" smtClean="0">
+                <a:cs typeface="Calibri"/>
+              </a:rPr>
+              <a:t>The Encryption Engines will accept any combination of an </a:t>
+            </a:r>
+            <a:r>
+              <a:rPr lang="en-US" sz="2600" dirty="0" err="1" smtClean="0">
+                <a:cs typeface="Calibri"/>
+              </a:rPr>
+              <a:t>Iterable</a:t>
+            </a:r>
+            <a:r>
+              <a:rPr lang="en-US" sz="2600" dirty="0" smtClean="0">
+                <a:cs typeface="Calibri"/>
+              </a:rPr>
+              <a:t> and a File-like object as arguments to </a:t>
+            </a:r>
+            <a:r>
+              <a:rPr lang="en-US" sz="2600" dirty="0" err="1" smtClean="0">
+                <a:cs typeface="Calibri"/>
+              </a:rPr>
+              <a:t>encrypt_file</a:t>
+            </a:r>
+            <a:r>
+              <a:rPr lang="en-US" sz="2600" dirty="0" smtClean="0">
+                <a:cs typeface="Calibri"/>
+              </a:rPr>
+              <a:t>() / </a:t>
+            </a:r>
+            <a:r>
+              <a:rPr lang="en-US" sz="2600" dirty="0" err="1" smtClean="0">
+                <a:cs typeface="Calibri"/>
+              </a:rPr>
+              <a:t>decrypt_file</a:t>
+            </a:r>
+            <a:r>
+              <a:rPr lang="en-US" sz="2600" dirty="0" smtClean="0">
+                <a:cs typeface="Calibri"/>
+              </a:rPr>
+              <a:t>() </a:t>
+            </a:r>
+          </a:p>
+          <a:p>
+            <a:r>
+              <a:rPr lang="en-US" sz="2600" dirty="0" smtClean="0">
+                <a:cs typeface="Calibri"/>
+              </a:rPr>
+              <a:t>This makes using a Vim Buffer (</a:t>
+            </a:r>
+            <a:r>
+              <a:rPr lang="en-US" sz="2600" dirty="0" err="1" smtClean="0">
+                <a:cs typeface="Calibri"/>
+              </a:rPr>
+              <a:t>iterable</a:t>
+            </a:r>
+            <a:r>
+              <a:rPr lang="en-US" sz="2600" dirty="0" smtClean="0">
+                <a:cs typeface="Calibri"/>
+              </a:rPr>
+              <a:t>) and File Handle with the encryption engine very easy! </a:t>
+            </a:r>
+            <a:endParaRPr lang="en-US" sz="2600" dirty="0">
+              <a:cs typeface="Calibri"/>
+            </a:endParaRPr>
+          </a:p>
+        </p:txBody>
+      </p:sp>
+      <p:pic>
+        <p:nvPicPr>
+          <p:cNvPr id="6" name="Picture 5"/>
+          <p:cNvPicPr>
+            <a:picLocks noChangeAspect="1"/>
+          </p:cNvPicPr>
+          <p:nvPr/>
+        </p:nvPicPr>
+        <p:blipFill>
+          <a:blip r:embed="rId2"/>
+          <a:stretch>
+            <a:fillRect/>
+          </a:stretch>
+        </p:blipFill>
+        <p:spPr>
+          <a:xfrm>
+            <a:off x="1452970" y="3933726"/>
+            <a:ext cx="9286058" cy="2231204"/>
+          </a:xfrm>
+          <a:prstGeom prst="rect">
+            <a:avLst/>
+          </a:prstGeom>
+        </p:spPr>
+      </p:pic>
     </p:spTree>
     <p:extLst>
       <p:ext uri="{BB962C8B-B14F-4D97-AF65-F5344CB8AC3E}">
@@ -5267,7 +5410,7 @@
           <p:cNvPr id="5" name="Picture 4">
             <a:extLst>
               <a:ext uri="{FF2B5EF4-FFF2-40B4-BE49-F238E27FC236}">
-                <a16:creationId xmlns:a16="http://schemas.microsoft.com/office/drawing/2014/main" id="{0FC171DE-300B-4C3E-850D-760FA980F7B3}"/>
+                <a16:creationId xmlns:a16="http://schemas.microsoft.com/office/drawing/2014/main" xmlns="" id="{0FC171DE-300B-4C3E-850D-760FA980F7B3}"/>
               </a:ext>
             </a:extLst>
           </p:cNvPr>
@@ -5401,7 +5544,7 @@
           <p:cNvPr id="4" name="Picture 4">
             <a:extLst>
               <a:ext uri="{FF2B5EF4-FFF2-40B4-BE49-F238E27FC236}">
-                <a16:creationId xmlns:a16="http://schemas.microsoft.com/office/drawing/2014/main" id="{54990C2E-8515-4BC8-83FC-DA9E46B889A9}"/>
+                <a16:creationId xmlns:a16="http://schemas.microsoft.com/office/drawing/2014/main" xmlns="" id="{54990C2E-8515-4BC8-83FC-DA9E46B889A9}"/>
               </a:ext>
             </a:extLst>
           </p:cNvPr>
@@ -5418,8 +5561,8 @@
         </p:blipFill>
         <p:spPr>
           <a:xfrm>
-            <a:off x="2665862" y="3965380"/>
-            <a:ext cx="6848901" cy="2703120"/>
+            <a:off x="2930101" y="3973332"/>
+            <a:ext cx="6331798" cy="2499030"/>
           </a:xfrm>
           <a:prstGeom prst="rect">
             <a:avLst/>

</xml_diff>